<commit_message>
Updated system modules diagrams.
</commit_message>
<xml_diff>
--- a/docs/system-modules.pptx
+++ b/docs/system-modules.pptx
@@ -13,7 +13,7 @@
   <p:sldIdLst>
     <p:sldId id="332" r:id="rId3"/>
   </p:sldIdLst>
-  <p:sldSz cx="5029200" cy="8047038"/>
+  <p:sldSz cx="5029200" cy="8778875"/>
   <p:notesSz cx="7099300" cy="10234613"/>
   <p:embeddedFontLst>
     <p:embeddedFont>
@@ -125,27 +125,27 @@
   <p:extLst>
     <p:ext uri="{EFAFB233-063F-42B5-8137-9DF3F51BA10A}">
       <p15:sldGuideLst xmlns:p15="http://schemas.microsoft.com/office/powerpoint/2012/main">
-        <p15:guide id="1" orient="horz" pos="2535" userDrawn="1">
+        <p15:guide id="1" orient="horz" pos="2765" userDrawn="1">
           <p15:clr>
             <a:srgbClr val="A4A3A4"/>
           </p15:clr>
         </p15:guide>
-        <p15:guide id="2" orient="horz" pos="4729" userDrawn="1">
+        <p15:guide id="2" orient="horz" pos="5158" userDrawn="1">
           <p15:clr>
             <a:srgbClr val="A4A3A4"/>
           </p15:clr>
         </p15:guide>
-        <p15:guide id="3" orient="horz" pos="1408" userDrawn="1">
+        <p15:guide id="3" orient="horz" pos="1536" userDrawn="1">
           <p15:clr>
             <a:srgbClr val="A4A3A4"/>
           </p15:clr>
         </p15:guide>
-        <p15:guide id="4" orient="horz" pos="1184" userDrawn="1">
+        <p15:guide id="4" orient="horz" pos="1291" userDrawn="1">
           <p15:clr>
             <a:srgbClr val="A4A3A4"/>
           </p15:clr>
         </p15:guide>
-        <p15:guide id="5" orient="horz" pos="4449" userDrawn="1">
+        <p15:guide id="5" orient="horz" pos="4853" userDrawn="1">
           <p15:clr>
             <a:srgbClr val="A4A3A4"/>
           </p15:clr>
@@ -155,27 +155,27 @@
             <a:srgbClr val="A4A3A4"/>
           </p15:clr>
         </p15:guide>
-        <p15:guide id="7" orient="horz" pos="3942" userDrawn="1">
+        <p15:guide id="7" orient="horz" pos="4301" userDrawn="1">
           <p15:clr>
             <a:srgbClr val="A4A3A4"/>
           </p15:clr>
         </p15:guide>
-        <p15:guide id="8" orient="horz" pos="3887" userDrawn="1">
+        <p15:guide id="8" orient="horz" pos="4241" userDrawn="1">
           <p15:clr>
             <a:srgbClr val="A4A3A4"/>
           </p15:clr>
         </p15:guide>
-        <p15:guide id="9" orient="horz" pos="283" userDrawn="1">
+        <p15:guide id="9" orient="horz" pos="309" userDrawn="1">
           <p15:clr>
             <a:srgbClr val="A4A3A4"/>
           </p15:clr>
         </p15:guide>
-        <p15:guide id="10" orient="horz" pos="510" userDrawn="1">
+        <p15:guide id="10" orient="horz" pos="557" userDrawn="1">
           <p15:clr>
             <a:srgbClr val="A4A3A4"/>
           </p15:clr>
         </p15:guide>
-        <p15:guide id="11" orient="horz" pos="3267" userDrawn="1">
+        <p15:guide id="11" orient="horz" pos="3564" userDrawn="1">
           <p15:clr>
             <a:srgbClr val="A4A3A4"/>
           </p15:clr>
@@ -316,7 +316,7 @@
           <a:p>
             <a:fld id="{59088EAF-6ECA-4616-85EF-35AA19C641F3}" type="datetimeFigureOut">
               <a:rPr lang="pt-PT" smtClean="0"/>
-              <a:t>08/05/2019</a:t>
+              <a:t>13/02/2020</a:t>
             </a:fld>
             <a:endParaRPr lang="pt-PT" dirty="0"/>
           </a:p>
@@ -481,7 +481,7 @@
           <a:p>
             <a:fld id="{3ABD2D7A-D230-4F91-BD59-0A39C2703BA8}" type="datetimeFigureOut">
               <a:rPr lang="pt-PT" smtClean="0"/>
-              <a:t>08/05/2019</a:t>
+              <a:t>13/02/2020</a:t>
             </a:fld>
             <a:endParaRPr lang="pt-PT" dirty="0"/>
           </a:p>
@@ -499,8 +499,8 @@
         </p:nvSpPr>
         <p:spPr>
           <a:xfrm>
-            <a:off x="2351088" y="768350"/>
-            <a:ext cx="2397125" cy="3836988"/>
+            <a:off x="2451100" y="768350"/>
+            <a:ext cx="2197100" cy="3836988"/>
           </a:xfrm>
           <a:prstGeom prst="rect">
             <a:avLst/>
@@ -777,8 +777,8 @@
         </p:nvSpPr>
         <p:spPr>
           <a:xfrm>
-            <a:off x="2351088" y="768350"/>
-            <a:ext cx="2397125" cy="3836988"/>
+            <a:off x="2451100" y="768350"/>
+            <a:ext cx="2197100" cy="3836988"/>
           </a:xfrm>
         </p:spPr>
       </p:sp>
@@ -880,8 +880,8 @@
         </p:nvSpPr>
         <p:spPr>
           <a:xfrm>
-            <a:off x="439544" y="2145909"/>
-            <a:ext cx="3395593" cy="3397638"/>
+            <a:off x="439554" y="2341069"/>
+            <a:ext cx="3395593" cy="3706636"/>
           </a:xfrm>
         </p:spPr>
         <p:txBody>
@@ -893,7 +893,7 @@
               <a:lnSpc>
                 <a:spcPct val="80000"/>
               </a:lnSpc>
-              <a:defRPr sz="4815">
+              <a:defRPr sz="4816">
                 <a:solidFill>
                   <a:schemeClr val="tx1"/>
                 </a:solidFill>
@@ -921,8 +921,8 @@
         </p:nvSpPr>
         <p:spPr>
           <a:xfrm>
-            <a:off x="439544" y="5632949"/>
-            <a:ext cx="3395593" cy="1430586"/>
+            <a:off x="439554" y="6145241"/>
+            <a:ext cx="3395593" cy="1560691"/>
           </a:xfrm>
         </p:spPr>
         <p:txBody>
@@ -941,7 +941,7 @@
                 </a:solidFill>
               </a:defRPr>
             </a:lvl1pPr>
-            <a:lvl2pPr marL="333438" indent="0" algn="ctr">
+            <a:lvl2pPr marL="333447" indent="0" algn="ctr">
               <a:buNone/>
               <a:defRPr>
                 <a:solidFill>
@@ -951,7 +951,7 @@
                 </a:solidFill>
               </a:defRPr>
             </a:lvl2pPr>
-            <a:lvl3pPr marL="666874" indent="0" algn="ctr">
+            <a:lvl3pPr marL="666892" indent="0" algn="ctr">
               <a:buNone/>
               <a:defRPr>
                 <a:solidFill>
@@ -961,7 +961,7 @@
                 </a:solidFill>
               </a:defRPr>
             </a:lvl3pPr>
-            <a:lvl4pPr marL="1000313" indent="0" algn="ctr">
+            <a:lvl4pPr marL="1000340" indent="0" algn="ctr">
               <a:buNone/>
               <a:defRPr>
                 <a:solidFill>
@@ -971,7 +971,7 @@
                 </a:solidFill>
               </a:defRPr>
             </a:lvl4pPr>
-            <a:lvl5pPr marL="1333754" indent="0" algn="ctr">
+            <a:lvl5pPr marL="1333789" indent="0" algn="ctr">
               <a:buNone/>
               <a:defRPr>
                 <a:solidFill>
@@ -981,7 +981,7 @@
                 </a:solidFill>
               </a:defRPr>
             </a:lvl5pPr>
-            <a:lvl6pPr marL="1667191" indent="0" algn="ctr">
+            <a:lvl6pPr marL="1667235" indent="0" algn="ctr">
               <a:buNone/>
               <a:defRPr>
                 <a:solidFill>
@@ -991,7 +991,7 @@
                 </a:solidFill>
               </a:defRPr>
             </a:lvl6pPr>
-            <a:lvl7pPr marL="2000628" indent="0" algn="ctr">
+            <a:lvl7pPr marL="2000681" indent="0" algn="ctr">
               <a:buNone/>
               <a:defRPr>
                 <a:solidFill>
@@ -1001,7 +1001,7 @@
                 </a:solidFill>
               </a:defRPr>
             </a:lvl7pPr>
-            <a:lvl8pPr marL="2334067" indent="0" algn="ctr">
+            <a:lvl8pPr marL="2334129" indent="0" algn="ctr">
               <a:buNone/>
               <a:defRPr>
                 <a:solidFill>
@@ -1011,7 +1011,7 @@
                 </a:solidFill>
               </a:defRPr>
             </a:lvl8pPr>
-            <a:lvl9pPr marL="2667508" indent="0" algn="ctr">
+            <a:lvl9pPr marL="2667580" indent="0" algn="ctr">
               <a:buNone/>
               <a:defRPr>
                 <a:solidFill>
@@ -1263,8 +1263,8 @@
         </p:nvSpPr>
         <p:spPr>
           <a:xfrm>
-            <a:off x="3772240" y="447066"/>
-            <a:ext cx="628814" cy="6616452"/>
+            <a:off x="3772240" y="487726"/>
+            <a:ext cx="628814" cy="7218184"/>
           </a:xfrm>
         </p:spPr>
         <p:txBody>
@@ -1291,8 +1291,8 @@
         </p:nvSpPr>
         <p:spPr>
           <a:xfrm>
-            <a:off x="628178" y="447066"/>
-            <a:ext cx="3049746" cy="6616452"/>
+            <a:off x="628178" y="487726"/>
+            <a:ext cx="3049746" cy="7218184"/>
           </a:xfrm>
         </p:spPr>
         <p:txBody>
@@ -1451,8 +1451,8 @@
         </p:nvSpPr>
         <p:spPr>
           <a:xfrm>
-            <a:off x="336382" y="447073"/>
-            <a:ext cx="4360763" cy="619216"/>
+            <a:off x="336391" y="487734"/>
+            <a:ext cx="4360763" cy="675531"/>
           </a:xfrm>
         </p:spPr>
         <p:txBody>
@@ -1489,8 +1489,8 @@
         </p:nvSpPr>
         <p:spPr>
           <a:xfrm>
-            <a:off x="336682" y="1150794"/>
-            <a:ext cx="4356179" cy="6083475"/>
+            <a:off x="336689" y="1255454"/>
+            <a:ext cx="4356179" cy="6636737"/>
           </a:xfrm>
         </p:spPr>
         <p:txBody>
@@ -1553,8 +1553,8 @@
         </p:nvSpPr>
         <p:spPr>
           <a:xfrm>
-            <a:off x="3517395" y="7529414"/>
-            <a:ext cx="598028" cy="324120"/>
+            <a:off x="3517395" y="8214177"/>
+            <a:ext cx="598028" cy="353597"/>
           </a:xfrm>
         </p:spPr>
         <p:txBody>
@@ -1577,8 +1577,8 @@
         </p:nvSpPr>
         <p:spPr>
           <a:xfrm>
-            <a:off x="534389" y="7510585"/>
-            <a:ext cx="2916714" cy="324120"/>
+            <a:off x="534389" y="8193637"/>
+            <a:ext cx="2916714" cy="353597"/>
           </a:xfrm>
         </p:spPr>
         <p:txBody>
@@ -1601,8 +1601,8 @@
         </p:nvSpPr>
         <p:spPr>
           <a:xfrm>
-            <a:off x="4181697" y="7510585"/>
-            <a:ext cx="345848" cy="324120"/>
+            <a:off x="4181697" y="8193637"/>
+            <a:ext cx="345848" cy="353597"/>
           </a:xfrm>
         </p:spPr>
         <p:txBody>
@@ -1685,8 +1685,8 @@
         </p:nvSpPr>
         <p:spPr>
           <a:xfrm>
-            <a:off x="437234" y="2950591"/>
-            <a:ext cx="3586548" cy="3308228"/>
+            <a:off x="437234" y="3218935"/>
+            <a:ext cx="3586548" cy="3609095"/>
           </a:xfrm>
         </p:spPr>
         <p:txBody>
@@ -1722,8 +1722,8 @@
         </p:nvSpPr>
         <p:spPr>
           <a:xfrm>
-            <a:off x="439541" y="6348259"/>
-            <a:ext cx="3584460" cy="715293"/>
+            <a:off x="439541" y="6925606"/>
+            <a:ext cx="3584460" cy="780345"/>
           </a:xfrm>
         </p:spPr>
         <p:txBody>
@@ -1742,7 +1742,7 @@
                 </a:solidFill>
               </a:defRPr>
             </a:lvl1pPr>
-            <a:lvl2pPr marL="333438" indent="0">
+            <a:lvl2pPr marL="333447" indent="0">
               <a:buNone/>
               <a:defRPr sz="1315">
                 <a:solidFill>
@@ -1752,7 +1752,7 @@
                 </a:solidFill>
               </a:defRPr>
             </a:lvl2pPr>
-            <a:lvl3pPr marL="666874" indent="0">
+            <a:lvl3pPr marL="666892" indent="0">
               <a:buNone/>
               <a:defRPr sz="1166">
                 <a:solidFill>
@@ -1762,7 +1762,7 @@
                 </a:solidFill>
               </a:defRPr>
             </a:lvl3pPr>
-            <a:lvl4pPr marL="1000313" indent="0">
+            <a:lvl4pPr marL="1000340" indent="0">
               <a:buNone/>
               <a:defRPr sz="1020">
                 <a:solidFill>
@@ -1772,7 +1772,7 @@
                 </a:solidFill>
               </a:defRPr>
             </a:lvl4pPr>
-            <a:lvl5pPr marL="1333754" indent="0">
+            <a:lvl5pPr marL="1333789" indent="0">
               <a:buNone/>
               <a:defRPr sz="1020">
                 <a:solidFill>
@@ -1782,7 +1782,7 @@
                 </a:solidFill>
               </a:defRPr>
             </a:lvl5pPr>
-            <a:lvl6pPr marL="1667191" indent="0">
+            <a:lvl6pPr marL="1667235" indent="0">
               <a:buNone/>
               <a:defRPr sz="1020">
                 <a:solidFill>
@@ -1792,7 +1792,7 @@
                 </a:solidFill>
               </a:defRPr>
             </a:lvl6pPr>
-            <a:lvl7pPr marL="2000628" indent="0">
+            <a:lvl7pPr marL="2000681" indent="0">
               <a:buNone/>
               <a:defRPr sz="1020">
                 <a:solidFill>
@@ -1802,7 +1802,7 @@
                 </a:solidFill>
               </a:defRPr>
             </a:lvl7pPr>
-            <a:lvl8pPr marL="2334067" indent="0">
+            <a:lvl8pPr marL="2334129" indent="0">
               <a:buNone/>
               <a:defRPr sz="1020">
                 <a:solidFill>
@@ -1812,7 +1812,7 @@
                 </a:solidFill>
               </a:defRPr>
             </a:lvl8pPr>
-            <a:lvl9pPr marL="2667508" indent="0">
+            <a:lvl9pPr marL="2667580" indent="0">
               <a:buNone/>
               <a:defRPr sz="1020">
                 <a:solidFill>
@@ -1947,8 +1947,8 @@
         </p:nvSpPr>
         <p:spPr>
           <a:xfrm>
-            <a:off x="628184" y="447078"/>
-            <a:ext cx="3772881" cy="1609408"/>
+            <a:off x="628186" y="487740"/>
+            <a:ext cx="3772881" cy="1755775"/>
           </a:xfrm>
         </p:spPr>
         <p:txBody>
@@ -1975,8 +1975,8 @@
         </p:nvSpPr>
         <p:spPr>
           <a:xfrm>
-            <a:off x="620898" y="2235309"/>
-            <a:ext cx="1823559" cy="4828223"/>
+            <a:off x="620899" y="2438601"/>
+            <a:ext cx="1823559" cy="5267325"/>
           </a:xfrm>
         </p:spPr>
         <p:txBody>
@@ -2062,8 +2062,8 @@
         </p:nvSpPr>
         <p:spPr>
           <a:xfrm>
-            <a:off x="2570219" y="2235309"/>
-            <a:ext cx="1823559" cy="4828223"/>
+            <a:off x="2570221" y="2438601"/>
+            <a:ext cx="1823559" cy="5267325"/>
           </a:xfrm>
         </p:spPr>
         <p:txBody>
@@ -2252,8 +2252,8 @@
         </p:nvSpPr>
         <p:spPr>
           <a:xfrm>
-            <a:off x="628184" y="447078"/>
-            <a:ext cx="3772881" cy="1609408"/>
+            <a:off x="628186" y="487740"/>
+            <a:ext cx="3772881" cy="1755775"/>
           </a:xfrm>
         </p:spPr>
         <p:txBody>
@@ -2284,8 +2284,8 @@
         </p:nvSpPr>
         <p:spPr>
           <a:xfrm>
-            <a:off x="628184" y="2235297"/>
-            <a:ext cx="1822303" cy="894114"/>
+            <a:off x="628194" y="2438588"/>
+            <a:ext cx="1822303" cy="975429"/>
           </a:xfrm>
         </p:spPr>
         <p:txBody>
@@ -2304,35 +2304,35 @@
                 </a:solidFill>
               </a:defRPr>
             </a:lvl1pPr>
-            <a:lvl2pPr marL="333438" indent="0">
+            <a:lvl2pPr marL="333447" indent="0">
               <a:buNone/>
               <a:defRPr sz="1458" b="1"/>
             </a:lvl2pPr>
-            <a:lvl3pPr marL="666874" indent="0">
+            <a:lvl3pPr marL="666892" indent="0">
               <a:buNone/>
               <a:defRPr sz="1315" b="1"/>
             </a:lvl3pPr>
-            <a:lvl4pPr marL="1000313" indent="0">
+            <a:lvl4pPr marL="1000340" indent="0">
               <a:buNone/>
               <a:defRPr sz="1166" b="1"/>
             </a:lvl4pPr>
-            <a:lvl5pPr marL="1333754" indent="0">
+            <a:lvl5pPr marL="1333789" indent="0">
               <a:buNone/>
               <a:defRPr sz="1166" b="1"/>
             </a:lvl5pPr>
-            <a:lvl6pPr marL="1667191" indent="0">
+            <a:lvl6pPr marL="1667235" indent="0">
               <a:buNone/>
               <a:defRPr sz="1166" b="1"/>
             </a:lvl6pPr>
-            <a:lvl7pPr marL="2000628" indent="0">
+            <a:lvl7pPr marL="2000681" indent="0">
               <a:buNone/>
               <a:defRPr sz="1166" b="1"/>
             </a:lvl7pPr>
-            <a:lvl8pPr marL="2334067" indent="0">
+            <a:lvl8pPr marL="2334129" indent="0">
               <a:buNone/>
               <a:defRPr sz="1166" b="1"/>
             </a:lvl8pPr>
-            <a:lvl9pPr marL="2667508" indent="0">
+            <a:lvl9pPr marL="2667580" indent="0">
               <a:buNone/>
               <a:defRPr sz="1166" b="1"/>
             </a:lvl9pPr>
@@ -2358,8 +2358,8 @@
         </p:nvSpPr>
         <p:spPr>
           <a:xfrm>
-            <a:off x="628184" y="3218833"/>
-            <a:ext cx="1822303" cy="3844697"/>
+            <a:off x="628194" y="3511572"/>
+            <a:ext cx="1822303" cy="4194352"/>
           </a:xfrm>
         </p:spPr>
         <p:txBody>
@@ -2445,8 +2445,8 @@
         </p:nvSpPr>
         <p:spPr>
           <a:xfrm>
-            <a:off x="2578751" y="2235297"/>
-            <a:ext cx="1822303" cy="894114"/>
+            <a:off x="2578752" y="2438588"/>
+            <a:ext cx="1822303" cy="975429"/>
           </a:xfrm>
         </p:spPr>
         <p:txBody>
@@ -2465,35 +2465,35 @@
                 </a:solidFill>
               </a:defRPr>
             </a:lvl1pPr>
-            <a:lvl2pPr marL="333438" indent="0">
+            <a:lvl2pPr marL="333447" indent="0">
               <a:buNone/>
               <a:defRPr sz="1458" b="1"/>
             </a:lvl2pPr>
-            <a:lvl3pPr marL="666874" indent="0">
+            <a:lvl3pPr marL="666892" indent="0">
               <a:buNone/>
               <a:defRPr sz="1315" b="1"/>
             </a:lvl3pPr>
-            <a:lvl4pPr marL="1000313" indent="0">
+            <a:lvl4pPr marL="1000340" indent="0">
               <a:buNone/>
               <a:defRPr sz="1166" b="1"/>
             </a:lvl4pPr>
-            <a:lvl5pPr marL="1333754" indent="0">
+            <a:lvl5pPr marL="1333789" indent="0">
               <a:buNone/>
               <a:defRPr sz="1166" b="1"/>
             </a:lvl5pPr>
-            <a:lvl6pPr marL="1667191" indent="0">
+            <a:lvl6pPr marL="1667235" indent="0">
               <a:buNone/>
               <a:defRPr sz="1166" b="1"/>
             </a:lvl6pPr>
-            <a:lvl7pPr marL="2000628" indent="0">
+            <a:lvl7pPr marL="2000681" indent="0">
               <a:buNone/>
               <a:defRPr sz="1166" b="1"/>
             </a:lvl7pPr>
-            <a:lvl8pPr marL="2334067" indent="0">
+            <a:lvl8pPr marL="2334129" indent="0">
               <a:buNone/>
               <a:defRPr sz="1166" b="1"/>
             </a:lvl8pPr>
-            <a:lvl9pPr marL="2667508" indent="0">
+            <a:lvl9pPr marL="2667580" indent="0">
               <a:buNone/>
               <a:defRPr sz="1166" b="1"/>
             </a:lvl9pPr>
@@ -2519,8 +2519,8 @@
         </p:nvSpPr>
         <p:spPr>
           <a:xfrm>
-            <a:off x="2578751" y="3218833"/>
-            <a:ext cx="1822303" cy="3844697"/>
+            <a:off x="2578752" y="3511572"/>
+            <a:ext cx="1822303" cy="4194352"/>
           </a:xfrm>
         </p:spPr>
         <p:txBody>
@@ -2960,8 +2960,8 @@
         </p:nvSpPr>
         <p:spPr>
           <a:xfrm>
-            <a:off x="435563" y="2235302"/>
-            <a:ext cx="1483987" cy="3129403"/>
+            <a:off x="435573" y="2438595"/>
+            <a:ext cx="1483987" cy="3414006"/>
           </a:xfrm>
         </p:spPr>
         <p:txBody>
@@ -3001,8 +3001,8 @@
         </p:nvSpPr>
         <p:spPr>
           <a:xfrm>
-            <a:off x="2043012" y="804716"/>
-            <a:ext cx="2641019" cy="6258808"/>
+            <a:off x="2043019" y="877901"/>
+            <a:ext cx="2641019" cy="6828015"/>
           </a:xfrm>
         </p:spPr>
         <p:txBody>
@@ -3088,8 +3088,8 @@
         </p:nvSpPr>
         <p:spPr>
           <a:xfrm>
-            <a:off x="439542" y="5454127"/>
-            <a:ext cx="1477712" cy="1609408"/>
+            <a:off x="439542" y="5950155"/>
+            <a:ext cx="1477712" cy="1755775"/>
           </a:xfrm>
         </p:spPr>
         <p:txBody>
@@ -3107,35 +3107,35 @@
               <a:buNone/>
               <a:defRPr sz="1315"/>
             </a:lvl1pPr>
-            <a:lvl2pPr marL="333438" indent="0">
+            <a:lvl2pPr marL="333447" indent="0">
               <a:buNone/>
               <a:defRPr sz="876"/>
             </a:lvl2pPr>
-            <a:lvl3pPr marL="666874" indent="0">
+            <a:lvl3pPr marL="666892" indent="0">
               <a:buNone/>
               <a:defRPr sz="728"/>
             </a:lvl3pPr>
-            <a:lvl4pPr marL="1000313" indent="0">
+            <a:lvl4pPr marL="1000340" indent="0">
               <a:buNone/>
               <a:defRPr sz="655"/>
             </a:lvl4pPr>
-            <a:lvl5pPr marL="1333754" indent="0">
+            <a:lvl5pPr marL="1333789" indent="0">
               <a:buNone/>
               <a:defRPr sz="655"/>
             </a:lvl5pPr>
-            <a:lvl6pPr marL="1667191" indent="0">
+            <a:lvl6pPr marL="1667235" indent="0">
               <a:buNone/>
               <a:defRPr sz="655"/>
             </a:lvl6pPr>
-            <a:lvl7pPr marL="2000628" indent="0">
+            <a:lvl7pPr marL="2000681" indent="0">
               <a:buNone/>
               <a:defRPr sz="655"/>
             </a:lvl7pPr>
-            <a:lvl8pPr marL="2334067" indent="0">
+            <a:lvl8pPr marL="2334129" indent="0">
               <a:buNone/>
               <a:defRPr sz="655"/>
             </a:lvl8pPr>
-            <a:lvl9pPr marL="2667508" indent="0">
+            <a:lvl9pPr marL="2667580" indent="0">
               <a:buNone/>
               <a:defRPr sz="655"/>
             </a:lvl9pPr>
@@ -3278,8 +3278,8 @@
         </p:nvSpPr>
         <p:spPr>
           <a:xfrm>
-            <a:off x="2043012" y="804716"/>
-            <a:ext cx="2641019" cy="6258808"/>
+            <a:off x="2043019" y="877901"/>
+            <a:ext cx="2641019" cy="6828015"/>
           </a:xfrm>
           <a:solidFill>
             <a:schemeClr val="bg2"/>
@@ -3300,35 +3300,35 @@
               <a:buNone/>
               <a:defRPr sz="1749"/>
             </a:lvl1pPr>
-            <a:lvl2pPr marL="333438" indent="0">
+            <a:lvl2pPr marL="333447" indent="0">
               <a:buNone/>
               <a:defRPr sz="2044"/>
             </a:lvl2pPr>
-            <a:lvl3pPr marL="666874" indent="0">
+            <a:lvl3pPr marL="666892" indent="0">
               <a:buNone/>
               <a:defRPr sz="1749"/>
             </a:lvl3pPr>
-            <a:lvl4pPr marL="1000313" indent="0">
+            <a:lvl4pPr marL="1000340" indent="0">
               <a:buNone/>
               <a:defRPr sz="1458"/>
             </a:lvl4pPr>
-            <a:lvl5pPr marL="1333754" indent="0">
+            <a:lvl5pPr marL="1333789" indent="0">
               <a:buNone/>
               <a:defRPr sz="1458"/>
             </a:lvl5pPr>
-            <a:lvl6pPr marL="1667191" indent="0">
+            <a:lvl6pPr marL="1667235" indent="0">
               <a:buNone/>
               <a:defRPr sz="1458"/>
             </a:lvl6pPr>
-            <a:lvl7pPr marL="2000628" indent="0">
+            <a:lvl7pPr marL="2000681" indent="0">
               <a:buNone/>
               <a:defRPr sz="1458"/>
             </a:lvl7pPr>
-            <a:lvl8pPr marL="2334067" indent="0">
+            <a:lvl8pPr marL="2334129" indent="0">
               <a:buNone/>
               <a:defRPr sz="1458"/>
             </a:lvl8pPr>
-            <a:lvl9pPr marL="2667508" indent="0">
+            <a:lvl9pPr marL="2667580" indent="0">
               <a:buNone/>
               <a:defRPr sz="1458"/>
             </a:lvl9pPr>
@@ -3353,8 +3353,8 @@
         </p:nvSpPr>
         <p:spPr>
           <a:xfrm>
-            <a:off x="435563" y="2235302"/>
-            <a:ext cx="1483987" cy="3129403"/>
+            <a:off x="435573" y="2438595"/>
+            <a:ext cx="1483987" cy="3414006"/>
           </a:xfrm>
         </p:spPr>
         <p:txBody>
@@ -3394,8 +3394,8 @@
         </p:nvSpPr>
         <p:spPr>
           <a:xfrm>
-            <a:off x="439542" y="5454127"/>
-            <a:ext cx="1477712" cy="1609408"/>
+            <a:off x="439542" y="5950155"/>
+            <a:ext cx="1477712" cy="1755775"/>
           </a:xfrm>
         </p:spPr>
         <p:txBody>
@@ -3413,35 +3413,35 @@
               <a:buNone/>
               <a:defRPr sz="1315"/>
             </a:lvl1pPr>
-            <a:lvl2pPr marL="333438" indent="0">
+            <a:lvl2pPr marL="333447" indent="0">
               <a:buNone/>
               <a:defRPr sz="876"/>
             </a:lvl2pPr>
-            <a:lvl3pPr marL="666874" indent="0">
+            <a:lvl3pPr marL="666892" indent="0">
               <a:buNone/>
               <a:defRPr sz="728"/>
             </a:lvl3pPr>
-            <a:lvl4pPr marL="1000313" indent="0">
+            <a:lvl4pPr marL="1000340" indent="0">
               <a:buNone/>
               <a:defRPr sz="655"/>
             </a:lvl4pPr>
-            <a:lvl5pPr marL="1333754" indent="0">
+            <a:lvl5pPr marL="1333789" indent="0">
               <a:buNone/>
               <a:defRPr sz="655"/>
             </a:lvl5pPr>
-            <a:lvl6pPr marL="1667191" indent="0">
+            <a:lvl6pPr marL="1667235" indent="0">
               <a:buNone/>
               <a:defRPr sz="655"/>
             </a:lvl6pPr>
-            <a:lvl7pPr marL="2000628" indent="0">
+            <a:lvl7pPr marL="2000681" indent="0">
               <a:buNone/>
               <a:defRPr sz="655"/>
             </a:lvl7pPr>
-            <a:lvl8pPr marL="2334067" indent="0">
+            <a:lvl8pPr marL="2334129" indent="0">
               <a:buNone/>
               <a:defRPr sz="655"/>
             </a:lvl8pPr>
-            <a:lvl9pPr marL="2667508" indent="0">
+            <a:lvl9pPr marL="2667580" indent="0">
               <a:buNone/>
               <a:defRPr sz="655"/>
             </a:lvl9pPr>
@@ -3585,8 +3585,8 @@
         </p:nvSpPr>
         <p:spPr>
           <a:xfrm>
-            <a:off x="628184" y="447078"/>
-            <a:ext cx="3772881" cy="1609408"/>
+            <a:off x="628186" y="487740"/>
+            <a:ext cx="3772881" cy="1755775"/>
           </a:xfrm>
           <a:prstGeom prst="rect">
             <a:avLst/>
@@ -3617,8 +3617,8 @@
         </p:nvSpPr>
         <p:spPr>
           <a:xfrm>
-            <a:off x="628174" y="2235312"/>
-            <a:ext cx="3768919" cy="4828224"/>
+            <a:off x="628184" y="2438606"/>
+            <a:ext cx="3768919" cy="5267327"/>
           </a:xfrm>
           <a:prstGeom prst="rect">
             <a:avLst/>
@@ -3678,8 +3678,8 @@
         </p:nvSpPr>
         <p:spPr>
           <a:xfrm>
-            <a:off x="3394313" y="7510585"/>
-            <a:ext cx="598028" cy="324120"/>
+            <a:off x="3394313" y="8193637"/>
+            <a:ext cx="598028" cy="353597"/>
           </a:xfrm>
           <a:prstGeom prst="rect">
             <a:avLst/>
@@ -3715,8 +3715,8 @@
         </p:nvSpPr>
         <p:spPr>
           <a:xfrm>
-            <a:off x="628176" y="7510585"/>
-            <a:ext cx="2703902" cy="324120"/>
+            <a:off x="628176" y="8193637"/>
+            <a:ext cx="2703902" cy="353597"/>
           </a:xfrm>
           <a:prstGeom prst="rect">
             <a:avLst/>
@@ -3752,8 +3752,8 @@
         </p:nvSpPr>
         <p:spPr>
           <a:xfrm>
-            <a:off x="4055213" y="7510585"/>
-            <a:ext cx="345848" cy="324120"/>
+            <a:off x="4055213" y="8193637"/>
+            <a:ext cx="345848" cy="353597"/>
           </a:xfrm>
           <a:prstGeom prst="rect">
             <a:avLst/>
@@ -3818,7 +3818,7 @@
   <p:hf hdr="0" ftr="0" dt="0"/>
   <p:txStyles>
     <p:titleStyle>
-      <a:lvl1pPr algn="l" defTabSz="666874" rtl="0" eaLnBrk="1" latinLnBrk="0" hangingPunct="1">
+      <a:lvl1pPr algn="l" defTabSz="666892" rtl="0" eaLnBrk="1" latinLnBrk="0" hangingPunct="1">
         <a:lnSpc>
           <a:spcPct val="90000"/>
         </a:lnSpc>
@@ -3837,7 +3837,7 @@
       </a:lvl1pPr>
     </p:titleStyle>
     <p:bodyStyle>
-      <a:lvl1pPr marL="163244" indent="-163244" algn="l" defTabSz="666874" rtl="0" eaLnBrk="1" latinLnBrk="0" hangingPunct="1">
+      <a:lvl1pPr marL="163247" indent="-163247" algn="l" defTabSz="666892" rtl="0" eaLnBrk="1" latinLnBrk="0" hangingPunct="1">
         <a:lnSpc>
           <a:spcPct val="90000"/>
         </a:lnSpc>
@@ -3859,7 +3859,7 @@
           <a:cs typeface="+mn-cs"/>
         </a:defRPr>
       </a:lvl1pPr>
-      <a:lvl2pPr marL="338069" indent="-169034" algn="l" defTabSz="666874" rtl="0" eaLnBrk="1" latinLnBrk="0" hangingPunct="1">
+      <a:lvl2pPr marL="338078" indent="-169039" algn="l" defTabSz="666892" rtl="0" eaLnBrk="1" latinLnBrk="0" hangingPunct="1">
         <a:lnSpc>
           <a:spcPct val="90000"/>
         </a:lnSpc>
@@ -3881,7 +3881,7 @@
           <a:cs typeface="+mn-cs"/>
         </a:defRPr>
       </a:lvl2pPr>
-      <a:lvl3pPr marL="497840" indent="-159772" algn="l" defTabSz="666874" rtl="0" eaLnBrk="1" latinLnBrk="0" hangingPunct="1">
+      <a:lvl3pPr marL="497853" indent="-159776" algn="l" defTabSz="666892" rtl="0" eaLnBrk="1" latinLnBrk="0" hangingPunct="1">
         <a:lnSpc>
           <a:spcPct val="90000"/>
         </a:lnSpc>
@@ -3903,7 +3903,7 @@
           <a:cs typeface="+mn-cs"/>
         </a:defRPr>
       </a:lvl3pPr>
-      <a:lvl4pPr marL="625195" indent="-127357" algn="l" defTabSz="666874" rtl="0" eaLnBrk="1" latinLnBrk="0" hangingPunct="1">
+      <a:lvl4pPr marL="625211" indent="-127361" algn="l" defTabSz="666892" rtl="0" eaLnBrk="1" latinLnBrk="0" hangingPunct="1">
         <a:lnSpc>
           <a:spcPct val="90000"/>
         </a:lnSpc>
@@ -3925,7 +3925,7 @@
           <a:cs typeface="+mn-cs"/>
         </a:defRPr>
       </a:lvl4pPr>
-      <a:lvl5pPr marL="751394" indent="-126198" algn="l" defTabSz="666874" rtl="0" eaLnBrk="1" latinLnBrk="0" hangingPunct="1">
+      <a:lvl5pPr marL="751415" indent="-126201" algn="l" defTabSz="666892" rtl="0" eaLnBrk="1" latinLnBrk="0" hangingPunct="1">
         <a:lnSpc>
           <a:spcPct val="90000"/>
         </a:lnSpc>
@@ -3947,7 +3947,7 @@
           <a:cs typeface="+mn-cs"/>
         </a:defRPr>
       </a:lvl5pPr>
-      <a:lvl6pPr marL="880279" indent="-126706" algn="l" defTabSz="666874" rtl="0" eaLnBrk="1" latinLnBrk="0" hangingPunct="1">
+      <a:lvl6pPr marL="880302" indent="-126709" algn="l" defTabSz="666892" rtl="0" eaLnBrk="1" latinLnBrk="0" hangingPunct="1">
         <a:spcBef>
           <a:spcPts val="439"/>
         </a:spcBef>
@@ -3965,7 +3965,7 @@
           <a:cs typeface="+mn-cs"/>
         </a:defRPr>
       </a:lvl6pPr>
-      <a:lvl7pPr marL="1006983" indent="-126706" algn="l" defTabSz="666874" rtl="0" eaLnBrk="1" latinLnBrk="0" hangingPunct="1">
+      <a:lvl7pPr marL="1007008" indent="-126709" algn="l" defTabSz="666892" rtl="0" eaLnBrk="1" latinLnBrk="0" hangingPunct="1">
         <a:spcBef>
           <a:spcPts val="439"/>
         </a:spcBef>
@@ -3983,7 +3983,7 @@
           <a:cs typeface="+mn-cs"/>
         </a:defRPr>
       </a:lvl7pPr>
-      <a:lvl8pPr marL="1133690" indent="-126706" algn="l" defTabSz="666874" rtl="0" eaLnBrk="1" latinLnBrk="0" hangingPunct="1">
+      <a:lvl8pPr marL="1133720" indent="-126709" algn="l" defTabSz="666892" rtl="0" eaLnBrk="1" latinLnBrk="0" hangingPunct="1">
         <a:spcBef>
           <a:spcPts val="439"/>
         </a:spcBef>
@@ -4001,7 +4001,7 @@
           <a:cs typeface="+mn-cs"/>
         </a:defRPr>
       </a:lvl8pPr>
-      <a:lvl9pPr marL="1260398" indent="-126706" algn="l" defTabSz="666874" rtl="0" eaLnBrk="1" latinLnBrk="0" hangingPunct="1">
+      <a:lvl9pPr marL="1260432" indent="-126709" algn="l" defTabSz="666892" rtl="0" eaLnBrk="1" latinLnBrk="0" hangingPunct="1">
         <a:spcBef>
           <a:spcPts val="439"/>
         </a:spcBef>
@@ -4024,7 +4024,7 @@
       <a:defPPr>
         <a:defRPr/>
       </a:defPPr>
-      <a:lvl1pPr marL="0" algn="l" defTabSz="666874" rtl="0" eaLnBrk="1" latinLnBrk="0" hangingPunct="1">
+      <a:lvl1pPr marL="0" algn="l" defTabSz="666892" rtl="0" eaLnBrk="1" latinLnBrk="0" hangingPunct="1">
         <a:defRPr sz="1315" kern="1200">
           <a:solidFill>
             <a:schemeClr val="tx1"/>
@@ -4034,7 +4034,7 @@
           <a:cs typeface="+mn-cs"/>
         </a:defRPr>
       </a:lvl1pPr>
-      <a:lvl2pPr marL="333438" algn="l" defTabSz="666874" rtl="0" eaLnBrk="1" latinLnBrk="0" hangingPunct="1">
+      <a:lvl2pPr marL="333447" algn="l" defTabSz="666892" rtl="0" eaLnBrk="1" latinLnBrk="0" hangingPunct="1">
         <a:defRPr sz="1315" kern="1200">
           <a:solidFill>
             <a:schemeClr val="tx1"/>
@@ -4044,7 +4044,7 @@
           <a:cs typeface="+mn-cs"/>
         </a:defRPr>
       </a:lvl2pPr>
-      <a:lvl3pPr marL="666874" algn="l" defTabSz="666874" rtl="0" eaLnBrk="1" latinLnBrk="0" hangingPunct="1">
+      <a:lvl3pPr marL="666892" algn="l" defTabSz="666892" rtl="0" eaLnBrk="1" latinLnBrk="0" hangingPunct="1">
         <a:defRPr sz="1315" kern="1200">
           <a:solidFill>
             <a:schemeClr val="tx1"/>
@@ -4054,7 +4054,7 @@
           <a:cs typeface="+mn-cs"/>
         </a:defRPr>
       </a:lvl3pPr>
-      <a:lvl4pPr marL="1000313" algn="l" defTabSz="666874" rtl="0" eaLnBrk="1" latinLnBrk="0" hangingPunct="1">
+      <a:lvl4pPr marL="1000340" algn="l" defTabSz="666892" rtl="0" eaLnBrk="1" latinLnBrk="0" hangingPunct="1">
         <a:defRPr sz="1315" kern="1200">
           <a:solidFill>
             <a:schemeClr val="tx1"/>
@@ -4064,7 +4064,7 @@
           <a:cs typeface="+mn-cs"/>
         </a:defRPr>
       </a:lvl4pPr>
-      <a:lvl5pPr marL="1333754" algn="l" defTabSz="666874" rtl="0" eaLnBrk="1" latinLnBrk="0" hangingPunct="1">
+      <a:lvl5pPr marL="1333789" algn="l" defTabSz="666892" rtl="0" eaLnBrk="1" latinLnBrk="0" hangingPunct="1">
         <a:defRPr sz="1315" kern="1200">
           <a:solidFill>
             <a:schemeClr val="tx1"/>
@@ -4074,7 +4074,7 @@
           <a:cs typeface="+mn-cs"/>
         </a:defRPr>
       </a:lvl5pPr>
-      <a:lvl6pPr marL="1667191" algn="l" defTabSz="666874" rtl="0" eaLnBrk="1" latinLnBrk="0" hangingPunct="1">
+      <a:lvl6pPr marL="1667235" algn="l" defTabSz="666892" rtl="0" eaLnBrk="1" latinLnBrk="0" hangingPunct="1">
         <a:defRPr sz="1315" kern="1200">
           <a:solidFill>
             <a:schemeClr val="tx1"/>
@@ -4084,7 +4084,7 @@
           <a:cs typeface="+mn-cs"/>
         </a:defRPr>
       </a:lvl6pPr>
-      <a:lvl7pPr marL="2000628" algn="l" defTabSz="666874" rtl="0" eaLnBrk="1" latinLnBrk="0" hangingPunct="1">
+      <a:lvl7pPr marL="2000681" algn="l" defTabSz="666892" rtl="0" eaLnBrk="1" latinLnBrk="0" hangingPunct="1">
         <a:defRPr sz="1315" kern="1200">
           <a:solidFill>
             <a:schemeClr val="tx1"/>
@@ -4094,7 +4094,7 @@
           <a:cs typeface="+mn-cs"/>
         </a:defRPr>
       </a:lvl7pPr>
-      <a:lvl8pPr marL="2334067" algn="l" defTabSz="666874" rtl="0" eaLnBrk="1" latinLnBrk="0" hangingPunct="1">
+      <a:lvl8pPr marL="2334129" algn="l" defTabSz="666892" rtl="0" eaLnBrk="1" latinLnBrk="0" hangingPunct="1">
         <a:defRPr sz="1315" kern="1200">
           <a:solidFill>
             <a:schemeClr val="tx1"/>
@@ -4104,7 +4104,7 @@
           <a:cs typeface="+mn-cs"/>
         </a:defRPr>
       </a:lvl8pPr>
-      <a:lvl9pPr marL="2667508" algn="l" defTabSz="666874" rtl="0" eaLnBrk="1" latinLnBrk="0" hangingPunct="1">
+      <a:lvl9pPr marL="2667580" algn="l" defTabSz="666892" rtl="0" eaLnBrk="1" latinLnBrk="0" hangingPunct="1">
         <a:defRPr sz="1315" kern="1200">
           <a:solidFill>
             <a:schemeClr val="tx1"/>
@@ -4152,7 +4152,7 @@
         </p:nvSpPr>
         <p:spPr>
           <a:xfrm>
-            <a:off x="163031" y="830898"/>
+            <a:off x="163031" y="801325"/>
             <a:ext cx="1040578" cy="630132"/>
           </a:xfrm>
           <a:prstGeom prst="downArrowCallout">
@@ -4196,7 +4196,7 @@
         </p:nvSpPr>
         <p:spPr>
           <a:xfrm>
-            <a:off x="154112" y="4836529"/>
+            <a:off x="154113" y="4806956"/>
             <a:ext cx="1040578" cy="630132"/>
           </a:xfrm>
           <a:prstGeom prst="downArrowCallout">
@@ -4247,7 +4247,7 @@
         </p:nvSpPr>
         <p:spPr>
           <a:xfrm>
-            <a:off x="154112" y="5512360"/>
+            <a:off x="154113" y="5482787"/>
             <a:ext cx="1040578" cy="630132"/>
           </a:xfrm>
           <a:prstGeom prst="downArrowCallout">
@@ -4291,7 +4291,7 @@
         </p:nvSpPr>
         <p:spPr>
           <a:xfrm>
-            <a:off x="163031" y="6847474"/>
+            <a:off x="163030" y="7522046"/>
             <a:ext cx="1040578" cy="630132"/>
           </a:xfrm>
           <a:prstGeom prst="downArrowCallout">
@@ -4335,7 +4335,7 @@
         </p:nvSpPr>
         <p:spPr>
           <a:xfrm>
-            <a:off x="154109" y="7520109"/>
+            <a:off x="154107" y="8194681"/>
             <a:ext cx="1040400" cy="378460"/>
           </a:xfrm>
           <a:prstGeom prst="rect">
@@ -4379,7 +4379,7 @@
         </p:nvSpPr>
         <p:spPr>
           <a:xfrm>
-            <a:off x="156922" y="4163362"/>
+            <a:off x="156923" y="4133789"/>
             <a:ext cx="1040578" cy="630132"/>
           </a:xfrm>
           <a:prstGeom prst="downArrowCallout">
@@ -4423,7 +4423,7 @@
         </p:nvSpPr>
         <p:spPr>
           <a:xfrm>
-            <a:off x="154110" y="1503258"/>
+            <a:off x="154111" y="1473685"/>
             <a:ext cx="1040578" cy="630132"/>
           </a:xfrm>
           <a:prstGeom prst="downArrowCallout">
@@ -4467,7 +4467,7 @@
         </p:nvSpPr>
         <p:spPr>
           <a:xfrm>
-            <a:off x="155021" y="3494317"/>
+            <a:off x="155022" y="3464744"/>
             <a:ext cx="1040578" cy="630132"/>
           </a:xfrm>
           <a:prstGeom prst="downArrowCallout">
@@ -4511,7 +4511,7 @@
         </p:nvSpPr>
         <p:spPr>
           <a:xfrm>
-            <a:off x="1264909" y="673945"/>
+            <a:off x="1264911" y="644374"/>
             <a:ext cx="3657600" cy="720080"/>
           </a:xfrm>
           <a:prstGeom prst="bracePair">
@@ -4543,12 +4543,12 @@
           </a:bodyPr>
           <a:lstStyle/>
           <a:p>
-            <a:pPr indent="-86423">
+            <a:pPr indent="-86426">
               <a:buFont typeface="Arial" panose="020B0604020202020204" pitchFamily="34" charset="0"/>
               <a:buChar char="•"/>
             </a:pPr>
             <a:r>
-              <a:rPr lang="pt-PT" sz="800" dirty="0" err="1">
+              <a:rPr lang="pt-PT" sz="801" dirty="0" err="1">
                 <a:solidFill>
                   <a:schemeClr val="bg1"/>
                 </a:solidFill>
@@ -4558,7 +4558,7 @@
               <a:t>drl</a:t>
             </a:r>
             <a:r>
-              <a:rPr lang="pt-PT" sz="800" dirty="0">
+              <a:rPr lang="pt-PT" sz="801" dirty="0">
                 <a:solidFill>
                   <a:schemeClr val="bg1"/>
                 </a:solidFill>
@@ -4568,7 +4568,7 @@
               <a:t>::</a:t>
             </a:r>
             <a:r>
-              <a:rPr lang="pt-PT" sz="800" dirty="0" err="1">
+              <a:rPr lang="pt-PT" sz="801" dirty="0" err="1">
                 <a:solidFill>
                   <a:schemeClr val="bg1"/>
                 </a:solidFill>
@@ -4577,7 +4577,7 @@
               </a:rPr>
               <a:t>Scale</a:t>
             </a:r>
-            <a:endParaRPr lang="pt-PT" sz="800" dirty="0">
+            <a:endParaRPr lang="pt-PT" sz="801" dirty="0">
               <a:solidFill>
                 <a:schemeClr val="bg1"/>
               </a:solidFill>
@@ -4586,12 +4586,12 @@
             </a:endParaRPr>
           </a:p>
           <a:p>
-            <a:pPr indent="-86423">
+            <a:pPr indent="-86426">
               <a:buFont typeface="Arial" panose="020B0604020202020204" pitchFamily="34" charset="0"/>
               <a:buChar char="•"/>
             </a:pPr>
             <a:r>
-              <a:rPr lang="pt-PT" sz="800" dirty="0" err="1">
+              <a:rPr lang="pt-PT" sz="801" dirty="0" err="1">
                 <a:solidFill>
                   <a:schemeClr val="bg1"/>
                 </a:solidFill>
@@ -4601,7 +4601,7 @@
               <a:t>pcl</a:t>
             </a:r>
             <a:r>
-              <a:rPr lang="pt-PT" sz="800" dirty="0">
+              <a:rPr lang="pt-PT" sz="801" dirty="0">
                 <a:solidFill>
                   <a:schemeClr val="bg1"/>
                 </a:solidFill>
@@ -4612,12 +4612,12 @@
             </a:r>
           </a:p>
           <a:p>
-            <a:pPr marL="86423" indent="-86423">
+            <a:pPr marL="86426" indent="-86426">
               <a:buFont typeface="Arial" panose="020B0604020202020204" pitchFamily="34" charset="0"/>
               <a:buChar char="•"/>
             </a:pPr>
             <a:r>
-              <a:rPr lang="pt-PT" sz="800" dirty="0">
+              <a:rPr lang="pt-PT" sz="801" dirty="0">
                 <a:solidFill>
                   <a:schemeClr val="bg1"/>
                 </a:solidFill>
@@ -4628,12 +4628,12 @@
             </a:r>
           </a:p>
           <a:p>
-            <a:pPr marL="86423" indent="-86423">
+            <a:pPr marL="86426" indent="-86426">
               <a:buFont typeface="Arial" panose="020B0604020202020204" pitchFamily="34" charset="0"/>
               <a:buChar char="•"/>
             </a:pPr>
             <a:r>
-              <a:rPr lang="pt-PT" sz="800" dirty="0">
+              <a:rPr lang="pt-PT" sz="801" dirty="0">
                 <a:solidFill>
                   <a:schemeClr val="bg1"/>
                 </a:solidFill>
@@ -4644,12 +4644,12 @@
             </a:r>
           </a:p>
           <a:p>
-            <a:pPr marL="86423" indent="-86423">
+            <a:pPr marL="86426" indent="-86426">
               <a:buFont typeface="Arial" panose="020B0604020202020204" pitchFamily="34" charset="0"/>
               <a:buChar char="•"/>
             </a:pPr>
             <a:r>
-              <a:rPr lang="pt-PT" sz="800" dirty="0">
+              <a:rPr lang="pt-PT" sz="801" dirty="0">
                 <a:solidFill>
                   <a:schemeClr val="bg1"/>
                 </a:solidFill>
@@ -4660,12 +4660,12 @@
             </a:r>
           </a:p>
           <a:p>
-            <a:pPr marL="86423" indent="-86423">
+            <a:pPr marL="86426" indent="-86426">
               <a:buFont typeface="Arial" panose="020B0604020202020204" pitchFamily="34" charset="0"/>
               <a:buChar char="•"/>
             </a:pPr>
             <a:r>
-              <a:rPr lang="pt-PT" sz="800" dirty="0">
+              <a:rPr lang="pt-PT" sz="801" dirty="0">
                 <a:solidFill>
                   <a:schemeClr val="bg1"/>
                 </a:solidFill>
@@ -4676,12 +4676,12 @@
             </a:r>
           </a:p>
           <a:p>
-            <a:pPr marL="86423" indent="-86423">
+            <a:pPr marL="86426" indent="-86426">
               <a:buFont typeface="Arial" panose="020B0604020202020204" pitchFamily="34" charset="0"/>
               <a:buChar char="•"/>
             </a:pPr>
             <a:r>
-              <a:rPr lang="pt-PT" sz="800" dirty="0">
+              <a:rPr lang="pt-PT" sz="801" dirty="0">
                 <a:solidFill>
                   <a:schemeClr val="bg1"/>
                 </a:solidFill>
@@ -4692,12 +4692,12 @@
             </a:r>
           </a:p>
           <a:p>
-            <a:pPr marL="86423" indent="-86423">
+            <a:pPr marL="86426" indent="-86426">
               <a:buFont typeface="Arial" panose="020B0604020202020204" pitchFamily="34" charset="0"/>
               <a:buChar char="•"/>
             </a:pPr>
             <a:r>
-              <a:rPr lang="pt-PT" sz="800" dirty="0">
+              <a:rPr lang="pt-PT" sz="801" dirty="0">
                 <a:solidFill>
                   <a:schemeClr val="bg1"/>
                 </a:solidFill>
@@ -4708,12 +4708,12 @@
             </a:r>
           </a:p>
           <a:p>
-            <a:pPr marL="86423" indent="-86423">
+            <a:pPr marL="86426" indent="-86426">
               <a:buFont typeface="Arial" panose="020B0604020202020204" pitchFamily="34" charset="0"/>
               <a:buChar char="•"/>
             </a:pPr>
             <a:r>
-              <a:rPr lang="pt-PT" sz="800" dirty="0">
+              <a:rPr lang="pt-PT" sz="801" dirty="0">
                 <a:solidFill>
                   <a:schemeClr val="bg1"/>
                 </a:solidFill>
@@ -4723,7 +4723,7 @@
               <a:t>pcl::</a:t>
             </a:r>
             <a:r>
-              <a:rPr lang="pt-PT" sz="800" dirty="0" err="1">
+              <a:rPr lang="pt-PT" sz="801" dirty="0" err="1">
                 <a:solidFill>
                   <a:schemeClr val="bg1"/>
                 </a:solidFill>
@@ -4732,7 +4732,7 @@
               </a:rPr>
               <a:t>VoxelGrid</a:t>
             </a:r>
-            <a:endParaRPr lang="pt-PT" sz="800" dirty="0">
+            <a:endParaRPr lang="pt-PT" sz="801" dirty="0">
               <a:solidFill>
                 <a:schemeClr val="bg1"/>
               </a:solidFill>
@@ -4750,7 +4750,7 @@
         </p:nvSpPr>
         <p:spPr>
           <a:xfrm>
-            <a:off x="1259556" y="1491732"/>
+            <a:off x="1259557" y="1462159"/>
             <a:ext cx="3657600" cy="441576"/>
           </a:xfrm>
           <a:prstGeom prst="bracePair">
@@ -4782,12 +4782,12 @@
           </a:bodyPr>
           <a:lstStyle/>
           <a:p>
-            <a:pPr marL="86423" indent="-86423">
+            <a:pPr marL="86426" indent="-86426">
               <a:buFont typeface="Arial" panose="020B0604020202020204" pitchFamily="34" charset="0"/>
               <a:buChar char="•"/>
             </a:pPr>
             <a:r>
-              <a:rPr lang="pt-PT" sz="800" dirty="0">
+              <a:rPr lang="pt-PT" sz="801" dirty="0">
                 <a:solidFill>
                   <a:schemeClr val="bg1"/>
                 </a:solidFill>
@@ -4798,12 +4798,12 @@
             </a:r>
           </a:p>
           <a:p>
-            <a:pPr marL="86423" indent="-86423">
+            <a:pPr marL="86426" indent="-86426">
               <a:buFont typeface="Arial" panose="020B0604020202020204" pitchFamily="34" charset="0"/>
               <a:buChar char="•"/>
             </a:pPr>
             <a:r>
-              <a:rPr lang="pt-PT" sz="800" dirty="0">
+              <a:rPr lang="pt-PT" sz="801" dirty="0">
                 <a:solidFill>
                   <a:schemeClr val="bg1"/>
                 </a:solidFill>
@@ -4814,12 +4814,12 @@
             </a:r>
           </a:p>
           <a:p>
-            <a:pPr marL="86423" indent="-86423">
+            <a:pPr marL="86426" indent="-86426">
               <a:buFont typeface="Arial" panose="020B0604020202020204" pitchFamily="34" charset="0"/>
               <a:buChar char="•"/>
             </a:pPr>
             <a:r>
-              <a:rPr lang="pt-PT" sz="800" dirty="0">
+              <a:rPr lang="pt-PT" sz="801" dirty="0">
                 <a:solidFill>
                   <a:schemeClr val="bg1"/>
                 </a:solidFill>
@@ -4830,12 +4830,12 @@
             </a:r>
           </a:p>
           <a:p>
-            <a:pPr marL="86423" indent="-86423">
+            <a:pPr marL="86426" indent="-86426">
               <a:buFont typeface="Arial" panose="020B0604020202020204" pitchFamily="34" charset="0"/>
               <a:buChar char="•"/>
             </a:pPr>
             <a:r>
-              <a:rPr lang="pt-PT" sz="800" dirty="0">
+              <a:rPr lang="pt-PT" sz="801" dirty="0">
                 <a:solidFill>
                   <a:schemeClr val="bg1"/>
                 </a:solidFill>
@@ -4855,7 +4855,7 @@
         </p:nvSpPr>
         <p:spPr>
           <a:xfrm>
-            <a:off x="1260468" y="3452664"/>
+            <a:off x="1260469" y="3423097"/>
             <a:ext cx="3657600" cy="490101"/>
           </a:xfrm>
           <a:prstGeom prst="bracePair">
@@ -4885,12 +4885,12 @@
           </a:bodyPr>
           <a:lstStyle/>
           <a:p>
-            <a:pPr marL="86423" indent="-86423">
+            <a:pPr marL="86426" indent="-86426">
               <a:buFont typeface="Arial" panose="020B0604020202020204" pitchFamily="34" charset="0"/>
               <a:buChar char="•"/>
             </a:pPr>
             <a:r>
-              <a:rPr lang="pt-PT" sz="800" dirty="0">
+              <a:rPr lang="pt-PT" sz="801" dirty="0">
                 <a:solidFill>
                   <a:schemeClr val="bg1"/>
                 </a:solidFill>
@@ -4901,11 +4901,11 @@
             </a:r>
           </a:p>
           <a:p>
-            <a:pPr marL="86423" indent="-86423">
+            <a:pPr marL="86426" indent="-86426">
               <a:buFont typeface="Arial" panose="020B0604020202020204" pitchFamily="34" charset="0"/>
               <a:buChar char="•"/>
             </a:pPr>
-            <a:endParaRPr lang="pt-PT" sz="800" dirty="0">
+            <a:endParaRPr lang="pt-PT" sz="801" dirty="0">
               <a:solidFill>
                 <a:schemeClr val="bg1"/>
               </a:solidFill>
@@ -4914,12 +4914,12 @@
             </a:endParaRPr>
           </a:p>
           <a:p>
-            <a:pPr marL="86423" indent="-86423">
+            <a:pPr marL="86426" indent="-86426">
               <a:buFont typeface="Arial" panose="020B0604020202020204" pitchFamily="34" charset="0"/>
               <a:buChar char="•"/>
             </a:pPr>
             <a:r>
-              <a:rPr lang="pt-PT" sz="800" dirty="0">
+              <a:rPr lang="pt-PT" sz="801" dirty="0">
                 <a:solidFill>
                   <a:schemeClr val="bg1"/>
                 </a:solidFill>
@@ -4930,7 +4930,7 @@
             </a:r>
           </a:p>
           <a:p>
-            <a:endParaRPr lang="pt-PT" sz="800" dirty="0">
+            <a:endParaRPr lang="pt-PT" sz="801" dirty="0">
               <a:solidFill>
                 <a:schemeClr val="bg1"/>
               </a:solidFill>
@@ -4948,7 +4948,7 @@
         </p:nvSpPr>
         <p:spPr>
           <a:xfrm>
-            <a:off x="1260468" y="4131983"/>
+            <a:off x="1260469" y="4102417"/>
             <a:ext cx="3657600" cy="490101"/>
           </a:xfrm>
           <a:prstGeom prst="bracePair">
@@ -4978,12 +4978,12 @@
           </a:bodyPr>
           <a:lstStyle/>
           <a:p>
-            <a:pPr marL="86423" indent="-86423">
+            <a:pPr marL="86426" indent="-86426">
               <a:buFont typeface="Arial" panose="020B0604020202020204" pitchFamily="34" charset="0"/>
               <a:buChar char="•"/>
             </a:pPr>
             <a:r>
-              <a:rPr lang="pt-PT" sz="800" dirty="0">
+              <a:rPr lang="pt-PT" sz="801" dirty="0">
                 <a:solidFill>
                   <a:schemeClr val="bg1"/>
                 </a:solidFill>
@@ -4994,12 +4994,12 @@
             </a:r>
           </a:p>
           <a:p>
-            <a:pPr marL="86423" indent="-86423">
+            <a:pPr marL="86426" indent="-86426">
               <a:buFont typeface="Arial" panose="020B0604020202020204" pitchFamily="34" charset="0"/>
               <a:buChar char="•"/>
             </a:pPr>
             <a:r>
-              <a:rPr lang="pt-PT" sz="800" dirty="0">
+              <a:rPr lang="pt-PT" sz="801" dirty="0">
                 <a:solidFill>
                   <a:schemeClr val="bg1"/>
                 </a:solidFill>
@@ -5010,12 +5010,12 @@
             </a:r>
           </a:p>
           <a:p>
-            <a:pPr marL="86423" indent="-86423">
+            <a:pPr marL="86426" indent="-86426">
               <a:buFont typeface="Arial" panose="020B0604020202020204" pitchFamily="34" charset="0"/>
               <a:buChar char="•"/>
             </a:pPr>
             <a:r>
-              <a:rPr lang="pt-PT" sz="800" dirty="0">
+              <a:rPr lang="pt-PT" sz="801" dirty="0">
                 <a:solidFill>
                   <a:schemeClr val="bg1"/>
                 </a:solidFill>
@@ -5026,12 +5026,12 @@
             </a:r>
           </a:p>
           <a:p>
-            <a:pPr marL="86423" indent="-86423">
+            <a:pPr marL="86426" indent="-86426">
               <a:buFont typeface="Arial" panose="020B0604020202020204" pitchFamily="34" charset="0"/>
               <a:buChar char="•"/>
             </a:pPr>
             <a:r>
-              <a:rPr lang="pt-PT" sz="800" dirty="0">
+              <a:rPr lang="pt-PT" sz="801" dirty="0">
                 <a:solidFill>
                   <a:schemeClr val="bg1"/>
                 </a:solidFill>
@@ -5042,12 +5042,12 @@
             </a:r>
           </a:p>
           <a:p>
-            <a:pPr marL="86423" indent="-86423">
+            <a:pPr marL="86426" indent="-86426">
               <a:buFont typeface="Arial" panose="020B0604020202020204" pitchFamily="34" charset="0"/>
               <a:buChar char="•"/>
             </a:pPr>
             <a:r>
-              <a:rPr lang="pt-PT" sz="800" dirty="0">
+              <a:rPr lang="pt-PT" sz="801" dirty="0">
                 <a:solidFill>
                   <a:schemeClr val="bg1"/>
                 </a:solidFill>
@@ -5058,12 +5058,12 @@
             </a:r>
           </a:p>
           <a:p>
-            <a:pPr marL="86423" indent="-86423">
+            <a:pPr marL="86426" indent="-86426">
               <a:buFont typeface="Arial" panose="020B0604020202020204" pitchFamily="34" charset="0"/>
               <a:buChar char="•"/>
             </a:pPr>
             <a:r>
-              <a:rPr lang="pt-PT" sz="800" dirty="0">
+              <a:rPr lang="pt-PT" sz="801" dirty="0">
                 <a:solidFill>
                   <a:schemeClr val="bg1"/>
                 </a:solidFill>
@@ -5083,7 +5083,7 @@
         </p:nvSpPr>
         <p:spPr>
           <a:xfrm>
-            <a:off x="1259560" y="5470643"/>
+            <a:off x="1259561" y="5441076"/>
             <a:ext cx="3657600" cy="490101"/>
           </a:xfrm>
           <a:prstGeom prst="bracePair">
@@ -5113,12 +5113,12 @@
           </a:bodyPr>
           <a:lstStyle/>
           <a:p>
-            <a:pPr marL="86423" indent="-86423">
+            <a:pPr marL="86426" indent="-86426">
               <a:buFont typeface="Arial" panose="020B0604020202020204" pitchFamily="34" charset="0"/>
               <a:buChar char="•"/>
             </a:pPr>
             <a:r>
-              <a:rPr lang="pt-PT" sz="800" dirty="0" err="1">
+              <a:rPr lang="pt-PT" sz="801" dirty="0" err="1">
                 <a:solidFill>
                   <a:schemeClr val="bg1"/>
                 </a:solidFill>
@@ -5128,7 +5128,7 @@
               <a:t>drl</a:t>
             </a:r>
             <a:r>
-              <a:rPr lang="pt-PT" sz="800" dirty="0">
+              <a:rPr lang="pt-PT" sz="801" dirty="0">
                 <a:solidFill>
                   <a:schemeClr val="bg1"/>
                 </a:solidFill>
@@ -5138,7 +5138,7 @@
               <a:t>::</a:t>
             </a:r>
             <a:r>
-              <a:rPr lang="pt-PT" sz="800" dirty="0" err="1">
+              <a:rPr lang="pt-PT" sz="801" dirty="0" err="1">
                 <a:solidFill>
                   <a:schemeClr val="bg1"/>
                 </a:solidFill>
@@ -5147,7 +5147,7 @@
               </a:rPr>
               <a:t>PrincipalComponentAnalysis</a:t>
             </a:r>
-            <a:endParaRPr lang="pt-PT" sz="800" dirty="0">
+            <a:endParaRPr lang="pt-PT" sz="801" dirty="0">
               <a:solidFill>
                 <a:schemeClr val="bg1"/>
               </a:solidFill>
@@ -5156,12 +5156,12 @@
             </a:endParaRPr>
           </a:p>
           <a:p>
-            <a:pPr marL="86423" indent="-86423">
+            <a:pPr marL="86426" indent="-86426">
               <a:buFont typeface="Arial" panose="020B0604020202020204" pitchFamily="34" charset="0"/>
               <a:buChar char="•"/>
             </a:pPr>
             <a:r>
-              <a:rPr lang="pt-PT" sz="800" dirty="0" err="1">
+              <a:rPr lang="pt-PT" sz="801" dirty="0" err="1">
                 <a:solidFill>
                   <a:schemeClr val="bg1"/>
                 </a:solidFill>
@@ -5171,7 +5171,7 @@
               <a:t>pcl</a:t>
             </a:r>
             <a:r>
-              <a:rPr lang="pt-PT" sz="800" dirty="0">
+              <a:rPr lang="pt-PT" sz="801" dirty="0">
                 <a:solidFill>
                   <a:schemeClr val="bg1"/>
                 </a:solidFill>
@@ -5182,12 +5182,12 @@
             </a:r>
           </a:p>
           <a:p>
-            <a:pPr marL="86423" indent="-86423">
+            <a:pPr marL="86426" indent="-86426">
               <a:buFont typeface="Arial" panose="020B0604020202020204" pitchFamily="34" charset="0"/>
               <a:buChar char="•"/>
             </a:pPr>
             <a:r>
-              <a:rPr lang="pt-PT" sz="800" dirty="0">
+              <a:rPr lang="pt-PT" sz="801" dirty="0">
                 <a:solidFill>
                   <a:schemeClr val="bg1"/>
                 </a:solidFill>
@@ -5198,12 +5198,12 @@
             </a:r>
           </a:p>
           <a:p>
-            <a:pPr marL="86423" indent="-86423">
+            <a:pPr marL="86426" indent="-86426">
               <a:buFont typeface="Arial" panose="020B0604020202020204" pitchFamily="34" charset="0"/>
               <a:buChar char="•"/>
             </a:pPr>
             <a:r>
-              <a:rPr lang="pt-PT" sz="800" dirty="0">
+              <a:rPr lang="pt-PT" sz="801" dirty="0">
                 <a:solidFill>
                   <a:schemeClr val="bg1"/>
                 </a:solidFill>
@@ -5214,12 +5214,12 @@
             </a:r>
           </a:p>
           <a:p>
-            <a:pPr marL="86423" indent="-86423">
+            <a:pPr marL="86426" indent="-86426">
               <a:buFont typeface="Arial" panose="020B0604020202020204" pitchFamily="34" charset="0"/>
               <a:buChar char="•"/>
             </a:pPr>
             <a:r>
-              <a:rPr lang="pt-PT" sz="800" dirty="0">
+              <a:rPr lang="pt-PT" sz="801" dirty="0">
                 <a:solidFill>
                   <a:schemeClr val="bg1"/>
                 </a:solidFill>
@@ -5230,12 +5230,12 @@
             </a:r>
           </a:p>
           <a:p>
-            <a:pPr marL="86423" indent="-86423">
+            <a:pPr marL="86426" indent="-86426">
               <a:buFont typeface="Arial" panose="020B0604020202020204" pitchFamily="34" charset="0"/>
               <a:buChar char="•"/>
             </a:pPr>
             <a:r>
-              <a:rPr lang="pt-PT" sz="800" dirty="0">
+              <a:rPr lang="pt-PT" sz="801" dirty="0">
                 <a:solidFill>
                   <a:schemeClr val="bg1"/>
                 </a:solidFill>
@@ -5246,12 +5246,12 @@
             </a:r>
           </a:p>
           <a:p>
-            <a:pPr marL="86423" indent="-86423">
+            <a:pPr marL="86426" indent="-86426">
               <a:buFont typeface="Arial" panose="020B0604020202020204" pitchFamily="34" charset="0"/>
               <a:buChar char="•"/>
             </a:pPr>
             <a:r>
-              <a:rPr lang="pt-PT" sz="800" dirty="0">
+              <a:rPr lang="pt-PT" sz="801" dirty="0">
                 <a:solidFill>
                   <a:schemeClr val="bg1"/>
                 </a:solidFill>
@@ -5262,12 +5262,12 @@
             </a:r>
           </a:p>
           <a:p>
-            <a:pPr marL="86423" indent="-86423">
+            <a:pPr marL="86426" indent="-86426">
               <a:buFont typeface="Arial" panose="020B0604020202020204" pitchFamily="34" charset="0"/>
               <a:buChar char="•"/>
             </a:pPr>
             <a:r>
-              <a:rPr lang="pt-PT" sz="800" dirty="0">
+              <a:rPr lang="pt-PT" sz="801" dirty="0">
                 <a:solidFill>
                   <a:schemeClr val="bg1"/>
                 </a:solidFill>
@@ -5287,7 +5287,7 @@
         </p:nvSpPr>
         <p:spPr>
           <a:xfrm>
-            <a:off x="1268479" y="6816714"/>
+            <a:off x="1268479" y="7491293"/>
             <a:ext cx="3657600" cy="490101"/>
           </a:xfrm>
           <a:prstGeom prst="bracePair">
@@ -5317,15 +5317,15 @@
           </a:bodyPr>
           <a:lstStyle/>
           <a:p>
-            <a:pPr marL="86423" indent="-86423" defTabSz="1046346">
+            <a:pPr marL="86426" indent="-86426" defTabSz="1046373">
               <a:buFont typeface="Arial" panose="020B0604020202020204" pitchFamily="34" charset="0"/>
               <a:buChar char="•"/>
               <a:tabLst>
-                <a:tab pos="959922" algn="l"/>
+                <a:tab pos="959946" algn="l"/>
               </a:tabLst>
             </a:pPr>
             <a:r>
-              <a:rPr lang="en-US" sz="800" dirty="0">
+              <a:rPr lang="en-US" sz="801" dirty="0">
                 <a:solidFill>
                   <a:schemeClr val="bg1"/>
                 </a:solidFill>
@@ -5336,12 +5336,12 @@
             </a:r>
           </a:p>
           <a:p>
-            <a:pPr marL="86423" indent="-86423">
+            <a:pPr marL="86426" indent="-86426">
               <a:buFont typeface="Arial" panose="020B0604020202020204" pitchFamily="34" charset="0"/>
               <a:buChar char="•"/>
             </a:pPr>
             <a:r>
-              <a:rPr lang="en-US" sz="800" dirty="0">
+              <a:rPr lang="en-US" sz="801" dirty="0">
                 <a:solidFill>
                   <a:schemeClr val="bg1"/>
                 </a:solidFill>
@@ -5352,12 +5352,12 @@
             </a:r>
           </a:p>
           <a:p>
-            <a:pPr marL="86423" indent="-86423">
+            <a:pPr marL="86426" indent="-86426">
               <a:buFont typeface="Arial" panose="020B0604020202020204" pitchFamily="34" charset="0"/>
               <a:buChar char="•"/>
             </a:pPr>
             <a:r>
-              <a:rPr lang="en-US" sz="800" dirty="0">
+              <a:rPr lang="en-US" sz="801" dirty="0">
                 <a:solidFill>
                   <a:schemeClr val="bg1"/>
                 </a:solidFill>
@@ -5368,12 +5368,12 @@
             </a:r>
           </a:p>
           <a:p>
-            <a:pPr marL="86423" indent="-86423">
+            <a:pPr marL="86426" indent="-86426">
               <a:buFont typeface="Arial" panose="020B0604020202020204" pitchFamily="34" charset="0"/>
               <a:buChar char="•"/>
             </a:pPr>
             <a:r>
-              <a:rPr lang="en-US" sz="800" dirty="0">
+              <a:rPr lang="en-US" sz="801" dirty="0">
                 <a:solidFill>
                   <a:schemeClr val="bg1"/>
                 </a:solidFill>
@@ -5393,7 +5393,7 @@
         </p:nvSpPr>
         <p:spPr>
           <a:xfrm>
-            <a:off x="154110" y="156617"/>
+            <a:off x="154111" y="127044"/>
             <a:ext cx="1040578" cy="630132"/>
           </a:xfrm>
           <a:prstGeom prst="downArrowCallout">
@@ -5437,7 +5437,7 @@
         </p:nvSpPr>
         <p:spPr>
           <a:xfrm>
-            <a:off x="1259556" y="98523"/>
+            <a:off x="1259557" y="68957"/>
             <a:ext cx="3657600" cy="490101"/>
           </a:xfrm>
           <a:prstGeom prst="bracePair">
@@ -5467,12 +5467,12 @@
           </a:bodyPr>
           <a:lstStyle/>
           <a:p>
-            <a:pPr marL="86423" indent="-86423">
+            <a:pPr marL="86426" indent="-86426">
               <a:buFont typeface="Arial" panose="020B0604020202020204" pitchFamily="34" charset="0"/>
               <a:buChar char="•"/>
             </a:pPr>
             <a:r>
-              <a:rPr lang="pt-PT" sz="800" dirty="0">
+              <a:rPr lang="pt-PT" sz="801" dirty="0">
                 <a:solidFill>
                   <a:schemeClr val="bg1"/>
                 </a:solidFill>
@@ -5483,7 +5483,7 @@
             </a:r>
           </a:p>
           <a:p>
-            <a:endParaRPr lang="pt-PT" sz="800" dirty="0">
+            <a:endParaRPr lang="pt-PT" sz="801" dirty="0">
               <a:solidFill>
                 <a:schemeClr val="bg1"/>
               </a:solidFill>
@@ -5492,12 +5492,12 @@
             </a:endParaRPr>
           </a:p>
           <a:p>
-            <a:pPr marL="86423" indent="-86423">
+            <a:pPr marL="86426" indent="-86426">
               <a:buFont typeface="Arial" panose="020B0604020202020204" pitchFamily="34" charset="0"/>
               <a:buChar char="•"/>
             </a:pPr>
             <a:r>
-              <a:rPr lang="pt-PT" sz="800" dirty="0" err="1">
+              <a:rPr lang="pt-PT" sz="801" dirty="0" err="1">
                 <a:solidFill>
                   <a:schemeClr val="bg1"/>
                 </a:solidFill>
@@ -5506,7 +5506,7 @@
               </a:rPr>
               <a:t>laserscan_to_pointcloud</a:t>
             </a:r>
-            <a:endParaRPr lang="pt-PT" sz="800" dirty="0">
+            <a:endParaRPr lang="pt-PT" sz="801" dirty="0">
               <a:solidFill>
                 <a:schemeClr val="bg1"/>
               </a:solidFill>
@@ -5515,7 +5515,7 @@
             </a:endParaRPr>
           </a:p>
           <a:p>
-            <a:endParaRPr lang="pt-PT" sz="800" dirty="0">
+            <a:endParaRPr lang="pt-PT" sz="801" dirty="0">
               <a:solidFill>
                 <a:schemeClr val="bg1"/>
               </a:solidFill>
@@ -5533,7 +5533,7 @@
         </p:nvSpPr>
         <p:spPr>
           <a:xfrm>
-            <a:off x="1260291" y="7464323"/>
+            <a:off x="1260290" y="8138901"/>
             <a:ext cx="3657600" cy="490101"/>
           </a:xfrm>
           <a:prstGeom prst="bracePair">
@@ -5563,12 +5563,12 @@
           </a:bodyPr>
           <a:lstStyle/>
           <a:p>
-            <a:pPr marL="86423" indent="-86423">
+            <a:pPr marL="86426" indent="-86426">
               <a:buFont typeface="Arial" panose="020B0604020202020204" pitchFamily="34" charset="0"/>
               <a:buChar char="•"/>
             </a:pPr>
             <a:r>
-              <a:rPr lang="pt-PT" sz="800" dirty="0">
+              <a:rPr lang="pt-PT" sz="801" dirty="0">
                 <a:solidFill>
                   <a:schemeClr val="bg1"/>
                 </a:solidFill>
@@ -5579,11 +5579,11 @@
             </a:r>
           </a:p>
           <a:p>
-            <a:pPr marL="86423" indent="-86423">
+            <a:pPr marL="86426" indent="-86426">
               <a:buFont typeface="Arial" panose="020B0604020202020204" pitchFamily="34" charset="0"/>
               <a:buChar char="•"/>
             </a:pPr>
-            <a:endParaRPr lang="pt-PT" sz="800" dirty="0">
+            <a:endParaRPr lang="pt-PT" sz="801" dirty="0">
               <a:solidFill>
                 <a:schemeClr val="bg1"/>
               </a:solidFill>
@@ -5592,12 +5592,12 @@
             </a:endParaRPr>
           </a:p>
           <a:p>
-            <a:pPr marL="86423" indent="-86423">
+            <a:pPr marL="86426" indent="-86426">
               <a:buFont typeface="Arial" panose="020B0604020202020204" pitchFamily="34" charset="0"/>
               <a:buChar char="•"/>
             </a:pPr>
             <a:r>
-              <a:rPr lang="pt-PT" sz="800" dirty="0">
+              <a:rPr lang="pt-PT" sz="801" dirty="0">
                 <a:solidFill>
                   <a:schemeClr val="bg1"/>
                 </a:solidFill>
@@ -5617,7 +5617,7 @@
         </p:nvSpPr>
         <p:spPr>
           <a:xfrm>
-            <a:off x="1259559" y="4792339"/>
+            <a:off x="1259560" y="4762772"/>
             <a:ext cx="3657600" cy="490101"/>
           </a:xfrm>
           <a:prstGeom prst="bracePair">
@@ -5647,12 +5647,12 @@
           </a:bodyPr>
           <a:lstStyle/>
           <a:p>
-            <a:pPr marL="86423" indent="-86423">
+            <a:pPr marL="86426" indent="-86426">
               <a:buFont typeface="Arial" panose="020B0604020202020204" pitchFamily="34" charset="0"/>
               <a:buChar char="•"/>
             </a:pPr>
             <a:r>
-              <a:rPr lang="pt-PT" sz="800" dirty="0">
+              <a:rPr lang="pt-PT" sz="801" dirty="0">
                 <a:solidFill>
                   <a:schemeClr val="bg1"/>
                 </a:solidFill>
@@ -5663,12 +5663,12 @@
             </a:r>
           </a:p>
           <a:p>
-            <a:pPr marL="86423" indent="-86423">
+            <a:pPr marL="86426" indent="-86426">
               <a:buFont typeface="Arial" panose="020B0604020202020204" pitchFamily="34" charset="0"/>
               <a:buChar char="•"/>
             </a:pPr>
             <a:r>
-              <a:rPr lang="pt-PT" sz="800" dirty="0">
+              <a:rPr lang="pt-PT" sz="801" dirty="0">
                 <a:solidFill>
                   <a:schemeClr val="bg1"/>
                 </a:solidFill>
@@ -5694,7 +5694,7 @@
         </p:nvSpPr>
         <p:spPr>
           <a:xfrm>
-            <a:off x="154112" y="6180692"/>
+            <a:off x="154111" y="6855264"/>
             <a:ext cx="1040578" cy="630132"/>
           </a:xfrm>
           <a:prstGeom prst="downArrowCallout">
@@ -5757,7 +5757,7 @@
         </p:nvSpPr>
         <p:spPr>
           <a:xfrm>
-            <a:off x="1259559" y="6169167"/>
+            <a:off x="1259558" y="6843740"/>
             <a:ext cx="3657600" cy="441576"/>
           </a:xfrm>
           <a:prstGeom prst="bracePair">
@@ -5789,12 +5789,12 @@
           </a:bodyPr>
           <a:lstStyle/>
           <a:p>
-            <a:pPr marL="86423" indent="-86423">
+            <a:pPr marL="86426" indent="-86426">
               <a:buFont typeface="Arial" panose="020B0604020202020204" pitchFamily="34" charset="0"/>
               <a:buChar char="•"/>
             </a:pPr>
             <a:r>
-              <a:rPr lang="pt-PT" sz="800" dirty="0" err="1">
+              <a:rPr lang="pt-PT" sz="801" dirty="0" err="1">
                 <a:solidFill>
                   <a:schemeClr val="bg1"/>
                 </a:solidFill>
@@ -5804,7 +5804,7 @@
               <a:t>drl</a:t>
             </a:r>
             <a:r>
-              <a:rPr lang="pt-PT" sz="800" dirty="0">
+              <a:rPr lang="pt-PT" sz="801" dirty="0">
                 <a:solidFill>
                   <a:schemeClr val="bg1"/>
                 </a:solidFill>
@@ -5814,7 +5814,7 @@
               <a:t>::</a:t>
             </a:r>
             <a:r>
-              <a:rPr lang="pt-PT" sz="800" dirty="0" err="1">
+              <a:rPr lang="pt-PT" sz="801" dirty="0" err="1">
                 <a:solidFill>
                   <a:schemeClr val="bg1"/>
                 </a:solidFill>
@@ -5823,7 +5823,7 @@
               </a:rPr>
               <a:t>EuclideanOutlierDetection</a:t>
             </a:r>
-            <a:endParaRPr lang="pt-PT" sz="800" dirty="0">
+            <a:endParaRPr lang="pt-PT" sz="801" dirty="0">
               <a:solidFill>
                 <a:schemeClr val="bg1"/>
               </a:solidFill>
@@ -5847,7 +5847,7 @@
         </p:nvSpPr>
         <p:spPr>
           <a:xfrm>
-            <a:off x="163031" y="2159801"/>
+            <a:off x="163031" y="2130228"/>
             <a:ext cx="1040578" cy="630132"/>
           </a:xfrm>
           <a:prstGeom prst="downArrowCallout">
@@ -5897,7 +5897,7 @@
         </p:nvSpPr>
         <p:spPr>
           <a:xfrm>
-            <a:off x="1272128" y="2125250"/>
+            <a:off x="1272129" y="2095677"/>
             <a:ext cx="3657600" cy="441576"/>
           </a:xfrm>
           <a:prstGeom prst="bracePair">
@@ -5929,12 +5929,12 @@
           </a:bodyPr>
           <a:lstStyle/>
           <a:p>
-            <a:pPr marL="86423" indent="-86423">
+            <a:pPr marL="86426" indent="-86426">
               <a:buFont typeface="Arial" panose="020B0604020202020204" pitchFamily="34" charset="0"/>
               <a:buChar char="•"/>
             </a:pPr>
             <a:r>
-              <a:rPr lang="pt-PT" sz="800" dirty="0" err="1">
+              <a:rPr lang="pt-PT" sz="801" dirty="0" err="1">
                 <a:solidFill>
                   <a:schemeClr val="bg1"/>
                 </a:solidFill>
@@ -5944,7 +5944,7 @@
               <a:t>drl</a:t>
             </a:r>
             <a:r>
-              <a:rPr lang="pt-PT" sz="800" dirty="0">
+              <a:rPr lang="pt-PT" sz="801" dirty="0">
                 <a:solidFill>
                   <a:schemeClr val="bg1"/>
                 </a:solidFill>
@@ -5954,7 +5954,7 @@
               <a:t>::</a:t>
             </a:r>
             <a:r>
-              <a:rPr lang="pt-PT" sz="800" dirty="0" err="1">
+              <a:rPr lang="pt-PT" sz="801" dirty="0" err="1">
                 <a:solidFill>
                   <a:schemeClr val="bg1"/>
                 </a:solidFill>
@@ -5963,7 +5963,7 @@
               </a:rPr>
               <a:t>TableTopPlaneSegmentation</a:t>
             </a:r>
-            <a:endParaRPr lang="pt-PT" sz="800" dirty="0">
+            <a:endParaRPr lang="pt-PT" sz="801" dirty="0">
               <a:solidFill>
                 <a:schemeClr val="bg1"/>
               </a:solidFill>
@@ -5972,12 +5972,12 @@
             </a:endParaRPr>
           </a:p>
           <a:p>
-            <a:pPr marL="86423" indent="-86423">
+            <a:pPr marL="86426" indent="-86426">
               <a:buFont typeface="Arial" panose="020B0604020202020204" pitchFamily="34" charset="0"/>
               <a:buChar char="•"/>
             </a:pPr>
             <a:r>
-              <a:rPr lang="pt-PT" sz="800" dirty="0" err="1">
+              <a:rPr lang="pt-PT" sz="801" dirty="0" err="1">
                 <a:solidFill>
                   <a:schemeClr val="bg1"/>
                 </a:solidFill>
@@ -5987,7 +5987,7 @@
               <a:t>pcl</a:t>
             </a:r>
             <a:r>
-              <a:rPr lang="pt-PT" sz="800" dirty="0">
+              <a:rPr lang="pt-PT" sz="801" dirty="0">
                 <a:solidFill>
                   <a:schemeClr val="bg1"/>
                 </a:solidFill>
@@ -5997,7 +5997,7 @@
               <a:t>::</a:t>
             </a:r>
             <a:r>
-              <a:rPr lang="pt-PT" sz="800" dirty="0" err="1">
+              <a:rPr lang="pt-PT" sz="801" dirty="0" err="1">
                 <a:solidFill>
                   <a:schemeClr val="bg1"/>
                 </a:solidFill>
@@ -6006,7 +6006,7 @@
               </a:rPr>
               <a:t>EuclideanClustering</a:t>
             </a:r>
-            <a:endParaRPr lang="pt-PT" sz="800" dirty="0">
+            <a:endParaRPr lang="pt-PT" sz="801" dirty="0">
               <a:solidFill>
                 <a:schemeClr val="bg1"/>
               </a:solidFill>
@@ -6015,12 +6015,12 @@
             </a:endParaRPr>
           </a:p>
           <a:p>
-            <a:pPr marL="86423" indent="-86423">
+            <a:pPr marL="86426" indent="-86426">
               <a:buFont typeface="Arial" panose="020B0604020202020204" pitchFamily="34" charset="0"/>
               <a:buChar char="•"/>
             </a:pPr>
             <a:r>
-              <a:rPr lang="pt-PT" sz="800" dirty="0" err="1">
+              <a:rPr lang="pt-PT" sz="801" dirty="0" err="1">
                 <a:solidFill>
                   <a:schemeClr val="bg1"/>
                 </a:solidFill>
@@ -6030,7 +6030,7 @@
               <a:t>pcl</a:t>
             </a:r>
             <a:r>
-              <a:rPr lang="pt-PT" sz="800" dirty="0">
+              <a:rPr lang="pt-PT" sz="801" dirty="0">
                 <a:solidFill>
                   <a:schemeClr val="bg1"/>
                 </a:solidFill>
@@ -6040,7 +6040,7 @@
               <a:t>::</a:t>
             </a:r>
             <a:r>
-              <a:rPr lang="pt-PT" sz="800" dirty="0" err="1">
+              <a:rPr lang="pt-PT" sz="801" dirty="0" err="1">
                 <a:solidFill>
                   <a:schemeClr val="bg1"/>
                 </a:solidFill>
@@ -6049,7 +6049,7 @@
               </a:rPr>
               <a:t>RegionGrowing</a:t>
             </a:r>
-            <a:endParaRPr lang="pt-PT" sz="800" dirty="0">
+            <a:endParaRPr lang="pt-PT" sz="801" dirty="0">
               <a:solidFill>
                 <a:schemeClr val="bg1"/>
               </a:solidFill>
@@ -6073,7 +6073,7 @@
         </p:nvSpPr>
         <p:spPr>
           <a:xfrm>
-            <a:off x="163031" y="2832435"/>
+            <a:off x="163031" y="2802862"/>
             <a:ext cx="1040578" cy="630132"/>
           </a:xfrm>
           <a:prstGeom prst="downArrowCallout">
@@ -6136,7 +6136,7 @@
         </p:nvSpPr>
         <p:spPr>
           <a:xfrm>
-            <a:off x="1272128" y="2797884"/>
+            <a:off x="1272129" y="2768311"/>
             <a:ext cx="3657600" cy="441576"/>
           </a:xfrm>
           <a:prstGeom prst="bracePair">
@@ -6168,12 +6168,12 @@
           </a:bodyPr>
           <a:lstStyle/>
           <a:p>
-            <a:pPr marL="86423" indent="-86423">
+            <a:pPr marL="86426" indent="-86426">
               <a:buFont typeface="Arial" panose="020B0604020202020204" pitchFamily="34" charset="0"/>
               <a:buChar char="•"/>
             </a:pPr>
             <a:r>
-              <a:rPr lang="pt-PT" sz="800" dirty="0" err="1">
+              <a:rPr lang="pt-PT" sz="801" dirty="0" err="1">
                 <a:solidFill>
                   <a:schemeClr val="bg1"/>
                 </a:solidFill>
@@ -6183,7 +6183,7 @@
               <a:t>drl</a:t>
             </a:r>
             <a:r>
-              <a:rPr lang="pt-PT" sz="800" dirty="0">
+              <a:rPr lang="pt-PT" sz="801" dirty="0">
                 <a:solidFill>
                   <a:schemeClr val="bg1"/>
                 </a:solidFill>
@@ -6193,7 +6193,7 @@
               <a:t>::</a:t>
             </a:r>
             <a:r>
-              <a:rPr lang="pt-PT" sz="800" dirty="0" err="1">
+              <a:rPr lang="pt-PT" sz="801" dirty="0" err="1">
                 <a:solidFill>
                   <a:schemeClr val="bg1"/>
                 </a:solidFill>
@@ -6202,7 +6202,7 @@
               </a:rPr>
               <a:t>MinClusterSizeSorter</a:t>
             </a:r>
-            <a:endParaRPr lang="pt-PT" sz="800" dirty="0">
+            <a:endParaRPr lang="pt-PT" sz="801" dirty="0">
               <a:solidFill>
                 <a:schemeClr val="bg1"/>
               </a:solidFill>
@@ -6211,12 +6211,12 @@
             </a:endParaRPr>
           </a:p>
           <a:p>
-            <a:pPr marL="86423" indent="-86423">
+            <a:pPr marL="86426" indent="-86426">
               <a:buFont typeface="Arial" panose="020B0604020202020204" pitchFamily="34" charset="0"/>
               <a:buChar char="•"/>
             </a:pPr>
             <a:r>
-              <a:rPr lang="pt-PT" sz="800" dirty="0" err="1">
+              <a:rPr lang="pt-PT" sz="801" dirty="0" err="1">
                 <a:solidFill>
                   <a:schemeClr val="bg1"/>
                 </a:solidFill>
@@ -6226,7 +6226,7 @@
               <a:t>drl</a:t>
             </a:r>
             <a:r>
-              <a:rPr lang="pt-PT" sz="800" dirty="0">
+              <a:rPr lang="pt-PT" sz="801" dirty="0">
                 <a:solidFill>
                   <a:schemeClr val="bg1"/>
                 </a:solidFill>
@@ -6236,7 +6236,7 @@
               <a:t>::</a:t>
             </a:r>
             <a:r>
-              <a:rPr lang="pt-PT" sz="800" dirty="0" err="1">
+              <a:rPr lang="pt-PT" sz="801" dirty="0" err="1">
                 <a:solidFill>
                   <a:schemeClr val="bg1"/>
                 </a:solidFill>
@@ -6245,7 +6245,7 @@
               </a:rPr>
               <a:t>MaxClusterSizeSorter</a:t>
             </a:r>
-            <a:endParaRPr lang="pt-PT" sz="800" dirty="0">
+            <a:endParaRPr lang="pt-PT" sz="801" dirty="0">
               <a:solidFill>
                 <a:schemeClr val="bg1"/>
               </a:solidFill>
@@ -6254,12 +6254,12 @@
             </a:endParaRPr>
           </a:p>
           <a:p>
-            <a:pPr marL="86423" indent="-86423">
+            <a:pPr marL="86426" indent="-86426">
               <a:buFont typeface="Arial" panose="020B0604020202020204" pitchFamily="34" charset="0"/>
               <a:buChar char="•"/>
             </a:pPr>
             <a:r>
-              <a:rPr lang="pt-PT" sz="800" dirty="0" err="1">
+              <a:rPr lang="pt-PT" sz="801" dirty="0" err="1">
                 <a:solidFill>
                   <a:schemeClr val="bg1"/>
                 </a:solidFill>
@@ -6269,7 +6269,7 @@
               <a:t>drl</a:t>
             </a:r>
             <a:r>
-              <a:rPr lang="pt-PT" sz="800" dirty="0">
+              <a:rPr lang="pt-PT" sz="801" dirty="0">
                 <a:solidFill>
                   <a:schemeClr val="bg1"/>
                 </a:solidFill>
@@ -6279,7 +6279,7 @@
               <a:t>::</a:t>
             </a:r>
             <a:r>
-              <a:rPr lang="pt-PT" sz="800" dirty="0" err="1">
+              <a:rPr lang="pt-PT" sz="801" dirty="0" err="1">
                 <a:solidFill>
                   <a:schemeClr val="bg1"/>
                 </a:solidFill>
@@ -6288,7 +6288,7 @@
               </a:rPr>
               <a:t>MinDistanceToOriginSorter</a:t>
             </a:r>
-            <a:endParaRPr lang="pt-PT" sz="800" dirty="0">
+            <a:endParaRPr lang="pt-PT" sz="801" dirty="0">
               <a:solidFill>
                 <a:schemeClr val="bg1"/>
               </a:solidFill>
@@ -6297,12 +6297,12 @@
             </a:endParaRPr>
           </a:p>
           <a:p>
-            <a:pPr marL="86423" indent="-86423">
+            <a:pPr marL="86426" indent="-86426">
               <a:buFont typeface="Arial" panose="020B0604020202020204" pitchFamily="34" charset="0"/>
               <a:buChar char="•"/>
             </a:pPr>
             <a:r>
-              <a:rPr lang="pt-PT" sz="800" dirty="0" err="1">
+              <a:rPr lang="pt-PT" sz="801" dirty="0" err="1">
                 <a:solidFill>
                   <a:schemeClr val="bg1"/>
                 </a:solidFill>
@@ -6312,7 +6312,7 @@
               <a:t>drl</a:t>
             </a:r>
             <a:r>
-              <a:rPr lang="pt-PT" sz="800" dirty="0">
+              <a:rPr lang="pt-PT" sz="801" dirty="0">
                 <a:solidFill>
                   <a:schemeClr val="bg1"/>
                 </a:solidFill>
@@ -6322,7 +6322,7 @@
               <a:t>::</a:t>
             </a:r>
             <a:r>
-              <a:rPr lang="pt-PT" sz="800" dirty="0" err="1">
+              <a:rPr lang="pt-PT" sz="801" dirty="0" err="1">
                 <a:solidFill>
                   <a:schemeClr val="bg1"/>
                 </a:solidFill>
@@ -6331,7 +6331,7 @@
               </a:rPr>
               <a:t>MaxDistanceToOriginSorter</a:t>
             </a:r>
-            <a:endParaRPr lang="pt-PT" sz="800" dirty="0">
+            <a:endParaRPr lang="pt-PT" sz="801" dirty="0">
               <a:solidFill>
                 <a:schemeClr val="bg1"/>
               </a:solidFill>
@@ -6340,12 +6340,12 @@
             </a:endParaRPr>
           </a:p>
           <a:p>
-            <a:pPr marL="86423" indent="-86423">
+            <a:pPr marL="86426" indent="-86426">
               <a:buFont typeface="Arial" panose="020B0604020202020204" pitchFamily="34" charset="0"/>
               <a:buChar char="•"/>
             </a:pPr>
             <a:r>
-              <a:rPr lang="pt-PT" sz="800" dirty="0" err="1">
+              <a:rPr lang="pt-PT" sz="801" dirty="0" err="1">
                 <a:solidFill>
                   <a:schemeClr val="bg1"/>
                 </a:solidFill>
@@ -6355,7 +6355,7 @@
               <a:t>drl</a:t>
             </a:r>
             <a:r>
-              <a:rPr lang="pt-PT" sz="800" dirty="0">
+              <a:rPr lang="pt-PT" sz="801" dirty="0">
                 <a:solidFill>
                   <a:schemeClr val="bg1"/>
                 </a:solidFill>
@@ -6365,7 +6365,7 @@
               <a:t>::</a:t>
             </a:r>
             <a:r>
-              <a:rPr lang="pt-PT" sz="800" dirty="0" err="1">
+              <a:rPr lang="pt-PT" sz="801" dirty="0" err="1">
                 <a:solidFill>
                   <a:schemeClr val="bg1"/>
                 </a:solidFill>
@@ -6374,7 +6374,7 @@
               </a:rPr>
               <a:t>MinAxisValueSorter</a:t>
             </a:r>
-            <a:endParaRPr lang="pt-PT" sz="800" dirty="0">
+            <a:endParaRPr lang="pt-PT" sz="801" dirty="0">
               <a:solidFill>
                 <a:schemeClr val="bg1"/>
               </a:solidFill>
@@ -6383,12 +6383,12 @@
             </a:endParaRPr>
           </a:p>
           <a:p>
-            <a:pPr marL="86423" indent="-86423">
+            <a:pPr marL="86426" indent="-86426">
               <a:buFont typeface="Arial" panose="020B0604020202020204" pitchFamily="34" charset="0"/>
               <a:buChar char="•"/>
             </a:pPr>
             <a:r>
-              <a:rPr lang="pt-PT" sz="800" dirty="0" err="1">
+              <a:rPr lang="pt-PT" sz="801" dirty="0" err="1">
                 <a:solidFill>
                   <a:schemeClr val="bg1"/>
                 </a:solidFill>
@@ -6398,7 +6398,7 @@
               <a:t>drl</a:t>
             </a:r>
             <a:r>
-              <a:rPr lang="pt-PT" sz="800" dirty="0">
+              <a:rPr lang="pt-PT" sz="801" dirty="0">
                 <a:solidFill>
                   <a:schemeClr val="bg1"/>
                 </a:solidFill>
@@ -6408,7 +6408,7 @@
               <a:t>::</a:t>
             </a:r>
             <a:r>
-              <a:rPr lang="pt-PT" sz="800" dirty="0" err="1">
+              <a:rPr lang="pt-PT" sz="801" dirty="0" err="1">
                 <a:solidFill>
                   <a:schemeClr val="bg1"/>
                 </a:solidFill>
@@ -6417,7 +6417,155 @@
               </a:rPr>
               <a:t>MaxAxisValueSorter</a:t>
             </a:r>
-            <a:endParaRPr lang="pt-PT" sz="800" dirty="0">
+            <a:endParaRPr lang="pt-PT" sz="801" dirty="0">
+              <a:solidFill>
+                <a:schemeClr val="bg1"/>
+              </a:solidFill>
+              <a:latin typeface="Arial" panose="020B0604020202020204" pitchFamily="34" charset="0"/>
+              <a:cs typeface="Arial" panose="020B0604020202020204" pitchFamily="34" charset="0"/>
+            </a:endParaRPr>
+          </a:p>
+        </p:txBody>
+      </p:sp>
+      <p:sp>
+        <p:nvSpPr>
+          <p:cNvPr id="26" name="Nota de aviso com seta para baixo 8">
+            <a:extLst>
+              <a:ext uri="{FF2B5EF4-FFF2-40B4-BE49-F238E27FC236}">
+                <a16:creationId xmlns:a16="http://schemas.microsoft.com/office/drawing/2014/main" id="{3D3FF4B5-A80D-4D9E-A880-FA18CE0F30D0}"/>
+              </a:ext>
+            </a:extLst>
+          </p:cNvPr>
+          <p:cNvSpPr/>
+          <p:nvPr/>
+        </p:nvSpPr>
+        <p:spPr>
+          <a:xfrm>
+            <a:off x="163033" y="6185678"/>
+            <a:ext cx="1040578" cy="630132"/>
+          </a:xfrm>
+          <a:prstGeom prst="downArrowCallout">
+            <a:avLst/>
+          </a:prstGeom>
+        </p:spPr>
+        <p:style>
+          <a:lnRef idx="0">
+            <a:schemeClr val="accent2"/>
+          </a:lnRef>
+          <a:fillRef idx="3">
+            <a:schemeClr val="accent2"/>
+          </a:fillRef>
+          <a:effectRef idx="3">
+            <a:schemeClr val="accent2"/>
+          </a:effectRef>
+          <a:fontRef idx="minor">
+            <a:schemeClr val="lt1"/>
+          </a:fontRef>
+        </p:style>
+        <p:txBody>
+          <a:bodyPr lIns="0" rIns="0" rtlCol="0" anchor="ctr"/>
+          <a:lstStyle/>
+          <a:p>
+            <a:pPr algn="ctr"/>
+            <a:r>
+              <a:rPr lang="en-US" sz="1020" dirty="0">
+                <a:latin typeface="Arial" panose="020B0604020202020204" pitchFamily="34" charset="0"/>
+                <a:cs typeface="Arial" panose="020B0604020202020204" pitchFamily="34" charset="0"/>
+              </a:rPr>
+              <a:t>Part symmetry</a:t>
+            </a:r>
+          </a:p>
+          <a:p>
+            <a:pPr algn="ctr"/>
+            <a:r>
+              <a:rPr lang="en-US" sz="1020" dirty="0">
+                <a:latin typeface="Arial" panose="020B0604020202020204" pitchFamily="34" charset="0"/>
+                <a:cs typeface="Arial" panose="020B0604020202020204" pitchFamily="34" charset="0"/>
+              </a:rPr>
+              <a:t>postprocessing</a:t>
+            </a:r>
+          </a:p>
+        </p:txBody>
+      </p:sp>
+      <p:sp>
+        <p:nvSpPr>
+          <p:cNvPr id="27" name="Double Brace 26">
+            <a:extLst>
+              <a:ext uri="{FF2B5EF4-FFF2-40B4-BE49-F238E27FC236}">
+                <a16:creationId xmlns:a16="http://schemas.microsoft.com/office/drawing/2014/main" id="{C5DA6BF0-9947-47CB-9715-F49B52D5ED17}"/>
+              </a:ext>
+            </a:extLst>
+          </p:cNvPr>
+          <p:cNvSpPr/>
+          <p:nvPr/>
+        </p:nvSpPr>
+        <p:spPr>
+          <a:xfrm>
+            <a:off x="1268481" y="6143967"/>
+            <a:ext cx="3657600" cy="490101"/>
+          </a:xfrm>
+          <a:prstGeom prst="bracePair">
+            <a:avLst/>
+          </a:prstGeom>
+        </p:spPr>
+        <p:style>
+          <a:lnRef idx="1">
+            <a:schemeClr val="accent1"/>
+          </a:lnRef>
+          <a:fillRef idx="0">
+            <a:schemeClr val="accent1"/>
+          </a:fillRef>
+          <a:effectRef idx="0">
+            <a:schemeClr val="accent1"/>
+          </a:effectRef>
+          <a:fontRef idx="minor">
+            <a:schemeClr val="tx1"/>
+          </a:fontRef>
+        </p:style>
+        <p:txBody>
+          <a:bodyPr rot="0" spcFirstLastPara="0" vertOverflow="overflow" horzOverflow="overflow" vert="horz" wrap="square" lIns="45720" tIns="44455" rIns="45720" bIns="44455" numCol="2" spcCol="0" rtlCol="0" fromWordArt="0" anchor="ctr" anchorCtr="0" forceAA="0" compatLnSpc="1">
+            <a:prstTxWarp prst="textNoShape">
+              <a:avLst/>
+            </a:prstTxWarp>
+            <a:noAutofit/>
+          </a:bodyPr>
+          <a:lstStyle/>
+          <a:p>
+            <a:pPr marL="86426" indent="-86426">
+              <a:buFont typeface="Arial" panose="020B0604020202020204" pitchFamily="34" charset="0"/>
+              <a:buChar char="•"/>
+            </a:pPr>
+            <a:r>
+              <a:rPr lang="pt-PT" sz="801" dirty="0" err="1">
+                <a:solidFill>
+                  <a:schemeClr val="bg1"/>
+                </a:solidFill>
+                <a:latin typeface="Arial" panose="020B0604020202020204" pitchFamily="34" charset="0"/>
+                <a:cs typeface="Arial" panose="020B0604020202020204" pitchFamily="34" charset="0"/>
+              </a:rPr>
+              <a:t>drl</a:t>
+            </a:r>
+            <a:r>
+              <a:rPr lang="pt-PT" sz="801" dirty="0">
+                <a:solidFill>
+                  <a:schemeClr val="bg1"/>
+                </a:solidFill>
+                <a:latin typeface="Arial" panose="020B0604020202020204" pitchFamily="34" charset="0"/>
+                <a:cs typeface="Arial" panose="020B0604020202020204" pitchFamily="34" charset="0"/>
+              </a:rPr>
+              <a:t>::</a:t>
+            </a:r>
+            <a:r>
+              <a:rPr lang="pt-PT" sz="801" dirty="0" err="1">
+                <a:solidFill>
+                  <a:schemeClr val="bg1"/>
+                </a:solidFill>
+                <a:latin typeface="Arial" panose="020B0604020202020204" pitchFamily="34" charset="0"/>
+                <a:cs typeface="Arial" panose="020B0604020202020204" pitchFamily="34" charset="0"/>
+              </a:rPr>
+              <a:t>TransformationAligner</a:t>
+            </a:r>
+            <a:endParaRPr lang="pt-PT" sz="801" dirty="0">
               <a:solidFill>
                 <a:schemeClr val="bg1"/>
               </a:solidFill>

</xml_diff>